<commit_message>
Update git internals section
</commit_message>
<xml_diff>
--- a/Introduction to Git.pptx
+++ b/Introduction to Git.pptx
@@ -5,7 +5,7 @@
     <p:sldMasterId id="2147483648" r:id="rId1"/>
   </p:sldMasterIdLst>
   <p:notesMasterIdLst>
-    <p:notesMasterId r:id="rId21"/>
+    <p:notesMasterId r:id="rId28"/>
   </p:notesMasterIdLst>
   <p:sldIdLst>
     <p:sldId id="256" r:id="rId2"/>
@@ -15,18 +15,25 @@
     <p:sldId id="262" r:id="rId6"/>
     <p:sldId id="283" r:id="rId7"/>
     <p:sldId id="264" r:id="rId8"/>
-    <p:sldId id="276" r:id="rId9"/>
-    <p:sldId id="263" r:id="rId10"/>
-    <p:sldId id="278" r:id="rId11"/>
-    <p:sldId id="284" r:id="rId12"/>
-    <p:sldId id="279" r:id="rId13"/>
-    <p:sldId id="280" r:id="rId14"/>
-    <p:sldId id="269" r:id="rId15"/>
-    <p:sldId id="285" r:id="rId16"/>
-    <p:sldId id="286" r:id="rId17"/>
-    <p:sldId id="277" r:id="rId18"/>
-    <p:sldId id="281" r:id="rId19"/>
-    <p:sldId id="282" r:id="rId20"/>
+    <p:sldId id="289" r:id="rId9"/>
+    <p:sldId id="276" r:id="rId10"/>
+    <p:sldId id="263" r:id="rId11"/>
+    <p:sldId id="278" r:id="rId12"/>
+    <p:sldId id="284" r:id="rId13"/>
+    <p:sldId id="279" r:id="rId14"/>
+    <p:sldId id="280" r:id="rId15"/>
+    <p:sldId id="290" r:id="rId16"/>
+    <p:sldId id="269" r:id="rId17"/>
+    <p:sldId id="285" r:id="rId18"/>
+    <p:sldId id="286" r:id="rId19"/>
+    <p:sldId id="277" r:id="rId20"/>
+    <p:sldId id="281" r:id="rId21"/>
+    <p:sldId id="291" r:id="rId22"/>
+    <p:sldId id="292" r:id="rId23"/>
+    <p:sldId id="293" r:id="rId24"/>
+    <p:sldId id="294" r:id="rId25"/>
+    <p:sldId id="295" r:id="rId26"/>
+    <p:sldId id="282" r:id="rId27"/>
   </p:sldIdLst>
   <p:sldSz cx="12192000" cy="6858000"/>
   <p:notesSz cx="6858000" cy="9144000"/>
@@ -215,7 +222,7 @@
           <a:p>
             <a:fld id="{7FB04A0B-E6B7-4D7B-AFC1-4FACB0C828A0}" type="datetimeFigureOut">
               <a:rPr lang="en-IE" smtClean="0"/>
-              <a:t>07/05/2014</a:t>
+              <a:t>10/05/2014</a:t>
             </a:fld>
             <a:endParaRPr lang="en-IE"/>
           </a:p>
@@ -828,7 +835,7 @@
           <a:p>
             <a:fld id="{F9F1FE97-DE10-4423-9150-9A9D83799C84}" type="slidenum">
               <a:rPr lang="en-IE" smtClean="0"/>
-              <a:t>17</a:t>
+              <a:t>19</a:t>
             </a:fld>
             <a:endParaRPr lang="en-IE"/>
           </a:p>
@@ -978,7 +985,7 @@
           <a:p>
             <a:fld id="{E7A22F15-6090-4F5B-83BC-7F1BA4DBBF33}" type="datetimeFigureOut">
               <a:rPr lang="en-IE" smtClean="0"/>
-              <a:t>07/05/2014</a:t>
+              <a:t>10/05/2014</a:t>
             </a:fld>
             <a:endParaRPr lang="en-IE"/>
           </a:p>
@@ -1148,7 +1155,7 @@
           <a:p>
             <a:fld id="{E7A22F15-6090-4F5B-83BC-7F1BA4DBBF33}" type="datetimeFigureOut">
               <a:rPr lang="en-IE" smtClean="0"/>
-              <a:t>07/05/2014</a:t>
+              <a:t>10/05/2014</a:t>
             </a:fld>
             <a:endParaRPr lang="en-IE"/>
           </a:p>
@@ -1328,7 +1335,7 @@
           <a:p>
             <a:fld id="{E7A22F15-6090-4F5B-83BC-7F1BA4DBBF33}" type="datetimeFigureOut">
               <a:rPr lang="en-IE" smtClean="0"/>
-              <a:t>07/05/2014</a:t>
+              <a:t>10/05/2014</a:t>
             </a:fld>
             <a:endParaRPr lang="en-IE"/>
           </a:p>
@@ -1498,7 +1505,7 @@
           <a:p>
             <a:fld id="{E7A22F15-6090-4F5B-83BC-7F1BA4DBBF33}" type="datetimeFigureOut">
               <a:rPr lang="en-IE" smtClean="0"/>
-              <a:t>07/05/2014</a:t>
+              <a:t>10/05/2014</a:t>
             </a:fld>
             <a:endParaRPr lang="en-IE"/>
           </a:p>
@@ -1744,7 +1751,7 @@
           <a:p>
             <a:fld id="{E7A22F15-6090-4F5B-83BC-7F1BA4DBBF33}" type="datetimeFigureOut">
               <a:rPr lang="en-IE" smtClean="0"/>
-              <a:t>07/05/2014</a:t>
+              <a:t>10/05/2014</a:t>
             </a:fld>
             <a:endParaRPr lang="en-IE"/>
           </a:p>
@@ -1976,7 +1983,7 @@
           <a:p>
             <a:fld id="{E7A22F15-6090-4F5B-83BC-7F1BA4DBBF33}" type="datetimeFigureOut">
               <a:rPr lang="en-IE" smtClean="0"/>
-              <a:t>07/05/2014</a:t>
+              <a:t>10/05/2014</a:t>
             </a:fld>
             <a:endParaRPr lang="en-IE"/>
           </a:p>
@@ -2343,7 +2350,7 @@
           <a:p>
             <a:fld id="{E7A22F15-6090-4F5B-83BC-7F1BA4DBBF33}" type="datetimeFigureOut">
               <a:rPr lang="en-IE" smtClean="0"/>
-              <a:t>07/05/2014</a:t>
+              <a:t>10/05/2014</a:t>
             </a:fld>
             <a:endParaRPr lang="en-IE"/>
           </a:p>
@@ -2461,7 +2468,7 @@
           <a:p>
             <a:fld id="{E7A22F15-6090-4F5B-83BC-7F1BA4DBBF33}" type="datetimeFigureOut">
               <a:rPr lang="en-IE" smtClean="0"/>
-              <a:t>07/05/2014</a:t>
+              <a:t>10/05/2014</a:t>
             </a:fld>
             <a:endParaRPr lang="en-IE"/>
           </a:p>
@@ -2556,7 +2563,7 @@
           <a:p>
             <a:fld id="{E7A22F15-6090-4F5B-83BC-7F1BA4DBBF33}" type="datetimeFigureOut">
               <a:rPr lang="en-IE" smtClean="0"/>
-              <a:t>07/05/2014</a:t>
+              <a:t>10/05/2014</a:t>
             </a:fld>
             <a:endParaRPr lang="en-IE"/>
           </a:p>
@@ -2833,7 +2840,7 @@
           <a:p>
             <a:fld id="{E7A22F15-6090-4F5B-83BC-7F1BA4DBBF33}" type="datetimeFigureOut">
               <a:rPr lang="en-IE" smtClean="0"/>
-              <a:t>07/05/2014</a:t>
+              <a:t>10/05/2014</a:t>
             </a:fld>
             <a:endParaRPr lang="en-IE"/>
           </a:p>
@@ -3086,7 +3093,7 @@
           <a:p>
             <a:fld id="{E7A22F15-6090-4F5B-83BC-7F1BA4DBBF33}" type="datetimeFigureOut">
               <a:rPr lang="en-IE" smtClean="0"/>
-              <a:t>07/05/2014</a:t>
+              <a:t>10/05/2014</a:t>
             </a:fld>
             <a:endParaRPr lang="en-IE"/>
           </a:p>
@@ -3299,7 +3306,7 @@
           <a:p>
             <a:fld id="{E7A22F15-6090-4F5B-83BC-7F1BA4DBBF33}" type="datetimeFigureOut">
               <a:rPr lang="en-IE" smtClean="0"/>
-              <a:t>07/05/2014</a:t>
+              <a:t>10/05/2014</a:t>
             </a:fld>
             <a:endParaRPr lang="en-IE"/>
           </a:p>
@@ -3956,6 +3963,488 @@
             <p:ph type="title"/>
           </p:nvPr>
         </p:nvSpPr>
+        <p:spPr>
+          <a:xfrm>
+            <a:off x="838200" y="402035"/>
+            <a:ext cx="10515600" cy="1325563"/>
+          </a:xfrm>
+        </p:spPr>
+        <p:txBody>
+          <a:bodyPr>
+            <a:normAutofit/>
+          </a:bodyPr>
+          <a:lstStyle/>
+          <a:p>
+            <a:r>
+              <a:rPr lang="en-IE" b="1" dirty="0" smtClean="0">
+                <a:solidFill>
+                  <a:schemeClr val="tx2"/>
+                </a:solidFill>
+              </a:rPr>
+              <a:t>Installation </a:t>
+            </a:r>
+            <a:r>
+              <a:rPr lang="en-IE" b="1" dirty="0">
+                <a:solidFill>
+                  <a:schemeClr val="tx2"/>
+                </a:solidFill>
+              </a:rPr>
+              <a:t>O</a:t>
+            </a:r>
+            <a:r>
+              <a:rPr lang="en-IE" b="1" dirty="0" smtClean="0">
+                <a:solidFill>
+                  <a:schemeClr val="tx2"/>
+                </a:solidFill>
+              </a:rPr>
+              <a:t>n Windows</a:t>
+            </a:r>
+            <a:endParaRPr lang="en-IE" b="1" dirty="0">
+              <a:solidFill>
+                <a:schemeClr val="tx2"/>
+              </a:solidFill>
+            </a:endParaRPr>
+          </a:p>
+        </p:txBody>
+      </p:sp>
+      <p:sp>
+        <p:nvSpPr>
+          <p:cNvPr id="3" name="Content Placeholder 2"/>
+          <p:cNvSpPr>
+            <a:spLocks noGrp="1"/>
+          </p:cNvSpPr>
+          <p:nvPr>
+            <p:ph idx="1"/>
+          </p:nvPr>
+        </p:nvSpPr>
+        <p:spPr>
+          <a:xfrm>
+            <a:off x="838200" y="1581546"/>
+            <a:ext cx="10515600" cy="1171575"/>
+          </a:xfrm>
+        </p:spPr>
+        <p:txBody>
+          <a:bodyPr>
+            <a:normAutofit/>
+          </a:bodyPr>
+          <a:lstStyle/>
+          <a:p>
+            <a:pPr marL="0" indent="0">
+              <a:buNone/>
+            </a:pPr>
+            <a:r>
+              <a:rPr lang="en-IE" dirty="0" smtClean="0">
+                <a:solidFill>
+                  <a:schemeClr val="tx2"/>
+                </a:solidFill>
+              </a:rPr>
+              <a:t/>
+            </a:r>
+            <a:br>
+              <a:rPr lang="en-IE" dirty="0" smtClean="0">
+                <a:solidFill>
+                  <a:schemeClr val="tx2"/>
+                </a:solidFill>
+              </a:rPr>
+            </a:br>
+            <a:r>
+              <a:rPr lang="en-IE" dirty="0" smtClean="0">
+                <a:solidFill>
+                  <a:schemeClr val="tx2"/>
+                </a:solidFill>
+              </a:rPr>
+              <a:t>http://msysgit.github.io/</a:t>
+            </a:r>
+            <a:endParaRPr lang="en-IE" dirty="0">
+              <a:solidFill>
+                <a:schemeClr val="tx2"/>
+              </a:solidFill>
+            </a:endParaRPr>
+          </a:p>
+        </p:txBody>
+      </p:sp>
+      <p:pic>
+        <p:nvPicPr>
+          <p:cNvPr id="4" name="Picture 3"/>
+          <p:cNvPicPr>
+            <a:picLocks noChangeAspect="1"/>
+          </p:cNvPicPr>
+          <p:nvPr/>
+        </p:nvPicPr>
+        <p:blipFill>
+          <a:blip r:embed="rId2">
+            <a:extLst>
+              <a:ext uri="{28A0092B-C50C-407E-A947-70E740481C1C}">
+                <a14:useLocalDpi xmlns:a14="http://schemas.microsoft.com/office/drawing/2010/main" val="0"/>
+              </a:ext>
+            </a:extLst>
+          </a:blip>
+          <a:stretch>
+            <a:fillRect/>
+          </a:stretch>
+        </p:blipFill>
+        <p:spPr>
+          <a:xfrm>
+            <a:off x="9433135" y="169334"/>
+            <a:ext cx="2519681" cy="1049867"/>
+          </a:xfrm>
+          <a:prstGeom prst="rect">
+            <a:avLst/>
+          </a:prstGeom>
+        </p:spPr>
+      </p:pic>
+      <p:sp>
+        <p:nvSpPr>
+          <p:cNvPr id="5" name="Title 1"/>
+          <p:cNvSpPr txBox="1">
+            <a:spLocks/>
+          </p:cNvSpPr>
+          <p:nvPr/>
+        </p:nvSpPr>
+        <p:spPr>
+          <a:xfrm>
+            <a:off x="838200" y="2675731"/>
+            <a:ext cx="10515600" cy="1325563"/>
+          </a:xfrm>
+          <a:prstGeom prst="rect">
+            <a:avLst/>
+          </a:prstGeom>
+        </p:spPr>
+        <p:txBody>
+          <a:bodyPr vert="horz" lIns="91440" tIns="45720" rIns="91440" bIns="45720" rtlCol="0" anchor="ctr">
+            <a:normAutofit/>
+          </a:bodyPr>
+          <a:lstStyle>
+            <a:lvl1pPr algn="l" defTabSz="914400" rtl="0" eaLnBrk="1" latinLnBrk="0" hangingPunct="1">
+              <a:lnSpc>
+                <a:spcPct val="90000"/>
+              </a:lnSpc>
+              <a:spcBef>
+                <a:spcPct val="0"/>
+              </a:spcBef>
+              <a:buNone/>
+              <a:defRPr sz="4400" kern="1200">
+                <a:solidFill>
+                  <a:schemeClr val="tx1"/>
+                </a:solidFill>
+                <a:latin typeface="+mj-lt"/>
+                <a:ea typeface="+mj-ea"/>
+                <a:cs typeface="+mj-cs"/>
+              </a:defRPr>
+            </a:lvl1pPr>
+          </a:lstStyle>
+          <a:p>
+            <a:r>
+              <a:rPr lang="en-IE" b="1" dirty="0" smtClean="0">
+                <a:solidFill>
+                  <a:schemeClr val="tx2"/>
+                </a:solidFill>
+              </a:rPr>
+              <a:t>Configure Git</a:t>
+            </a:r>
+            <a:endParaRPr lang="en-IE" b="1" dirty="0">
+              <a:solidFill>
+                <a:schemeClr val="tx2"/>
+              </a:solidFill>
+            </a:endParaRPr>
+          </a:p>
+        </p:txBody>
+      </p:sp>
+      <p:sp>
+        <p:nvSpPr>
+          <p:cNvPr id="6" name="Content Placeholder 2"/>
+          <p:cNvSpPr txBox="1">
+            <a:spLocks/>
+          </p:cNvSpPr>
+          <p:nvPr/>
+        </p:nvSpPr>
+        <p:spPr>
+          <a:xfrm>
+            <a:off x="838200" y="4061487"/>
+            <a:ext cx="10515600" cy="2023269"/>
+          </a:xfrm>
+          <a:prstGeom prst="rect">
+            <a:avLst/>
+          </a:prstGeom>
+        </p:spPr>
+        <p:txBody>
+          <a:bodyPr vert="horz" lIns="91440" tIns="45720" rIns="91440" bIns="45720" rtlCol="0">
+            <a:normAutofit/>
+          </a:bodyPr>
+          <a:lstStyle>
+            <a:lvl1pPr marL="228600" indent="-228600" algn="l" defTabSz="914400" rtl="0" eaLnBrk="1" latinLnBrk="0" hangingPunct="1">
+              <a:lnSpc>
+                <a:spcPct val="90000"/>
+              </a:lnSpc>
+              <a:spcBef>
+                <a:spcPts val="1000"/>
+              </a:spcBef>
+              <a:buFont typeface="Arial" panose="020B0604020202020204" pitchFamily="34" charset="0"/>
+              <a:buChar char="•"/>
+              <a:defRPr sz="2800" kern="1200">
+                <a:solidFill>
+                  <a:schemeClr val="tx1"/>
+                </a:solidFill>
+                <a:latin typeface="+mn-lt"/>
+                <a:ea typeface="+mn-ea"/>
+                <a:cs typeface="+mn-cs"/>
+              </a:defRPr>
+            </a:lvl1pPr>
+            <a:lvl2pPr marL="685800" indent="-228600" algn="l" defTabSz="914400" rtl="0" eaLnBrk="1" latinLnBrk="0" hangingPunct="1">
+              <a:lnSpc>
+                <a:spcPct val="90000"/>
+              </a:lnSpc>
+              <a:spcBef>
+                <a:spcPts val="500"/>
+              </a:spcBef>
+              <a:buFont typeface="Arial" panose="020B0604020202020204" pitchFamily="34" charset="0"/>
+              <a:buChar char="•"/>
+              <a:defRPr sz="2400" kern="1200">
+                <a:solidFill>
+                  <a:schemeClr val="tx1"/>
+                </a:solidFill>
+                <a:latin typeface="+mn-lt"/>
+                <a:ea typeface="+mn-ea"/>
+                <a:cs typeface="+mn-cs"/>
+              </a:defRPr>
+            </a:lvl2pPr>
+            <a:lvl3pPr marL="1143000" indent="-228600" algn="l" defTabSz="914400" rtl="0" eaLnBrk="1" latinLnBrk="0" hangingPunct="1">
+              <a:lnSpc>
+                <a:spcPct val="90000"/>
+              </a:lnSpc>
+              <a:spcBef>
+                <a:spcPts val="500"/>
+              </a:spcBef>
+              <a:buFont typeface="Arial" panose="020B0604020202020204" pitchFamily="34" charset="0"/>
+              <a:buChar char="•"/>
+              <a:defRPr sz="2000" kern="1200">
+                <a:solidFill>
+                  <a:schemeClr val="tx1"/>
+                </a:solidFill>
+                <a:latin typeface="+mn-lt"/>
+                <a:ea typeface="+mn-ea"/>
+                <a:cs typeface="+mn-cs"/>
+              </a:defRPr>
+            </a:lvl3pPr>
+            <a:lvl4pPr marL="1600200" indent="-228600" algn="l" defTabSz="914400" rtl="0" eaLnBrk="1" latinLnBrk="0" hangingPunct="1">
+              <a:lnSpc>
+                <a:spcPct val="90000"/>
+              </a:lnSpc>
+              <a:spcBef>
+                <a:spcPts val="500"/>
+              </a:spcBef>
+              <a:buFont typeface="Arial" panose="020B0604020202020204" pitchFamily="34" charset="0"/>
+              <a:buChar char="•"/>
+              <a:defRPr sz="1800" kern="1200">
+                <a:solidFill>
+                  <a:schemeClr val="tx1"/>
+                </a:solidFill>
+                <a:latin typeface="+mn-lt"/>
+                <a:ea typeface="+mn-ea"/>
+                <a:cs typeface="+mn-cs"/>
+              </a:defRPr>
+            </a:lvl4pPr>
+            <a:lvl5pPr marL="2057400" indent="-228600" algn="l" defTabSz="914400" rtl="0" eaLnBrk="1" latinLnBrk="0" hangingPunct="1">
+              <a:lnSpc>
+                <a:spcPct val="90000"/>
+              </a:lnSpc>
+              <a:spcBef>
+                <a:spcPts val="500"/>
+              </a:spcBef>
+              <a:buFont typeface="Arial" panose="020B0604020202020204" pitchFamily="34" charset="0"/>
+              <a:buChar char="•"/>
+              <a:defRPr sz="1800" kern="1200">
+                <a:solidFill>
+                  <a:schemeClr val="tx1"/>
+                </a:solidFill>
+                <a:latin typeface="+mn-lt"/>
+                <a:ea typeface="+mn-ea"/>
+                <a:cs typeface="+mn-cs"/>
+              </a:defRPr>
+            </a:lvl5pPr>
+            <a:lvl6pPr marL="2514600" indent="-228600" algn="l" defTabSz="914400" rtl="0" eaLnBrk="1" latinLnBrk="0" hangingPunct="1">
+              <a:lnSpc>
+                <a:spcPct val="90000"/>
+              </a:lnSpc>
+              <a:spcBef>
+                <a:spcPts val="500"/>
+              </a:spcBef>
+              <a:buFont typeface="Arial" panose="020B0604020202020204" pitchFamily="34" charset="0"/>
+              <a:buChar char="•"/>
+              <a:defRPr sz="1800" kern="1200">
+                <a:solidFill>
+                  <a:schemeClr val="tx1"/>
+                </a:solidFill>
+                <a:latin typeface="+mn-lt"/>
+                <a:ea typeface="+mn-ea"/>
+                <a:cs typeface="+mn-cs"/>
+              </a:defRPr>
+            </a:lvl6pPr>
+            <a:lvl7pPr marL="2971800" indent="-228600" algn="l" defTabSz="914400" rtl="0" eaLnBrk="1" latinLnBrk="0" hangingPunct="1">
+              <a:lnSpc>
+                <a:spcPct val="90000"/>
+              </a:lnSpc>
+              <a:spcBef>
+                <a:spcPts val="500"/>
+              </a:spcBef>
+              <a:buFont typeface="Arial" panose="020B0604020202020204" pitchFamily="34" charset="0"/>
+              <a:buChar char="•"/>
+              <a:defRPr sz="1800" kern="1200">
+                <a:solidFill>
+                  <a:schemeClr val="tx1"/>
+                </a:solidFill>
+                <a:latin typeface="+mn-lt"/>
+                <a:ea typeface="+mn-ea"/>
+                <a:cs typeface="+mn-cs"/>
+              </a:defRPr>
+            </a:lvl7pPr>
+            <a:lvl8pPr marL="3429000" indent="-228600" algn="l" defTabSz="914400" rtl="0" eaLnBrk="1" latinLnBrk="0" hangingPunct="1">
+              <a:lnSpc>
+                <a:spcPct val="90000"/>
+              </a:lnSpc>
+              <a:spcBef>
+                <a:spcPts val="500"/>
+              </a:spcBef>
+              <a:buFont typeface="Arial" panose="020B0604020202020204" pitchFamily="34" charset="0"/>
+              <a:buChar char="•"/>
+              <a:defRPr sz="1800" kern="1200">
+                <a:solidFill>
+                  <a:schemeClr val="tx1"/>
+                </a:solidFill>
+                <a:latin typeface="+mn-lt"/>
+                <a:ea typeface="+mn-ea"/>
+                <a:cs typeface="+mn-cs"/>
+              </a:defRPr>
+            </a:lvl8pPr>
+            <a:lvl9pPr marL="3886200" indent="-228600" algn="l" defTabSz="914400" rtl="0" eaLnBrk="1" latinLnBrk="0" hangingPunct="1">
+              <a:lnSpc>
+                <a:spcPct val="90000"/>
+              </a:lnSpc>
+              <a:spcBef>
+                <a:spcPts val="500"/>
+              </a:spcBef>
+              <a:buFont typeface="Arial" panose="020B0604020202020204" pitchFamily="34" charset="0"/>
+              <a:buChar char="•"/>
+              <a:defRPr sz="1800" kern="1200">
+                <a:solidFill>
+                  <a:schemeClr val="tx1"/>
+                </a:solidFill>
+                <a:latin typeface="+mn-lt"/>
+                <a:ea typeface="+mn-ea"/>
+                <a:cs typeface="+mn-cs"/>
+              </a:defRPr>
+            </a:lvl9pPr>
+          </a:lstStyle>
+          <a:p>
+            <a:r>
+              <a:rPr lang="en-IE" smtClean="0">
+                <a:solidFill>
+                  <a:schemeClr val="tx2"/>
+                </a:solidFill>
+              </a:rPr>
+              <a:t>Levels</a:t>
+            </a:r>
+          </a:p>
+          <a:p>
+            <a:pPr lvl="1"/>
+            <a:r>
+              <a:rPr lang="en-IE" smtClean="0">
+                <a:solidFill>
+                  <a:schemeClr val="tx2"/>
+                </a:solidFill>
+              </a:rPr>
+              <a:t>System</a:t>
+            </a:r>
+          </a:p>
+          <a:p>
+            <a:pPr lvl="1"/>
+            <a:r>
+              <a:rPr lang="en-IE" smtClean="0">
+                <a:solidFill>
+                  <a:schemeClr val="tx2"/>
+                </a:solidFill>
+              </a:rPr>
+              <a:t>User</a:t>
+            </a:r>
+          </a:p>
+          <a:p>
+            <a:pPr lvl="1"/>
+            <a:r>
+              <a:rPr lang="en-IE" smtClean="0">
+                <a:solidFill>
+                  <a:schemeClr val="tx2"/>
+                </a:solidFill>
+              </a:rPr>
+              <a:t>Repository</a:t>
+            </a:r>
+          </a:p>
+          <a:p>
+            <a:pPr marL="457200" lvl="1" indent="0">
+              <a:buFont typeface="Arial" panose="020B0604020202020204" pitchFamily="34" charset="0"/>
+              <a:buNone/>
+            </a:pPr>
+            <a:endParaRPr lang="en-IE" smtClean="0">
+              <a:solidFill>
+                <a:schemeClr val="tx2"/>
+              </a:solidFill>
+            </a:endParaRPr>
+          </a:p>
+          <a:p>
+            <a:pPr marL="0" indent="0">
+              <a:buFont typeface="Arial" panose="020B0604020202020204" pitchFamily="34" charset="0"/>
+              <a:buNone/>
+            </a:pPr>
+            <a:endParaRPr lang="en-IE" dirty="0"/>
+          </a:p>
+        </p:txBody>
+      </p:sp>
+    </p:spTree>
+    <p:extLst>
+      <p:ext uri="{BB962C8B-B14F-4D97-AF65-F5344CB8AC3E}">
+        <p14:creationId xmlns:p14="http://schemas.microsoft.com/office/powerpoint/2010/main" val="616174293"/>
+      </p:ext>
+    </p:extLst>
+  </p:cSld>
+  <p:clrMapOvr>
+    <a:masterClrMapping/>
+  </p:clrMapOvr>
+  <p:timing>
+    <p:tnLst>
+      <p:par>
+        <p:cTn id="1" dur="indefinite" restart="never" nodeType="tmRoot"/>
+      </p:par>
+    </p:tnLst>
+  </p:timing>
+</p:sld>
+</file>
+
+<file path=ppt/slides/slide11.xml><?xml version="1.0" encoding="utf-8"?>
+<p:sld xmlns:a="http://schemas.openxmlformats.org/drawingml/2006/main" xmlns:r="http://schemas.openxmlformats.org/officeDocument/2006/relationships" xmlns:p="http://schemas.openxmlformats.org/presentationml/2006/main">
+  <p:cSld>
+    <p:spTree>
+      <p:nvGrpSpPr>
+        <p:cNvPr id="1" name=""/>
+        <p:cNvGrpSpPr/>
+        <p:nvPr/>
+      </p:nvGrpSpPr>
+      <p:grpSpPr>
+        <a:xfrm>
+          <a:off x="0" y="0"/>
+          <a:ext cx="0" cy="0"/>
+          <a:chOff x="0" y="0"/>
+          <a:chExt cx="0" cy="0"/>
+        </a:xfrm>
+      </p:grpSpPr>
+      <p:sp>
+        <p:nvSpPr>
+          <p:cNvPr id="2" name="Title 1"/>
+          <p:cNvSpPr>
+            <a:spLocks noGrp="1"/>
+          </p:cNvSpPr>
+          <p:nvPr>
+            <p:ph type="title"/>
+          </p:nvPr>
+        </p:nvSpPr>
         <p:spPr/>
         <p:txBody>
           <a:bodyPr>
@@ -4176,7 +4665,7 @@
 </p:sld>
 </file>
 
-<file path=ppt/slides/slide11.xml><?xml version="1.0" encoding="utf-8"?>
+<file path=ppt/slides/slide12.xml><?xml version="1.0" encoding="utf-8"?>
 <p:sld xmlns:a="http://schemas.openxmlformats.org/drawingml/2006/main" xmlns:r="http://schemas.openxmlformats.org/officeDocument/2006/relationships" xmlns:p="http://schemas.openxmlformats.org/presentationml/2006/main">
   <p:cSld>
     <p:spTree>
@@ -4663,7 +5152,7 @@
 </p:sld>
 </file>
 
-<file path=ppt/slides/slide12.xml><?xml version="1.0" encoding="utf-8"?>
+<file path=ppt/slides/slide13.xml><?xml version="1.0" encoding="utf-8"?>
 <p:sld xmlns:a="http://schemas.openxmlformats.org/drawingml/2006/main" xmlns:r="http://schemas.openxmlformats.org/officeDocument/2006/relationships" xmlns:p="http://schemas.openxmlformats.org/presentationml/2006/main">
   <p:cSld>
     <p:spTree>
@@ -4911,7 +5400,7 @@
 </p:sld>
 </file>
 
-<file path=ppt/slides/slide13.xml><?xml version="1.0" encoding="utf-8"?>
+<file path=ppt/slides/slide14.xml><?xml version="1.0" encoding="utf-8"?>
 <p:sld xmlns:a="http://schemas.openxmlformats.org/drawingml/2006/main" xmlns:r="http://schemas.openxmlformats.org/officeDocument/2006/relationships" xmlns:p="http://schemas.openxmlformats.org/presentationml/2006/main">
   <p:cSld>
     <p:spTree>
@@ -5130,7 +5619,214 @@
 </p:sld>
 </file>
 
-<file path=ppt/slides/slide14.xml><?xml version="1.0" encoding="utf-8"?>
+<file path=ppt/slides/slide15.xml><?xml version="1.0" encoding="utf-8"?>
+<p:sld xmlns:a="http://schemas.openxmlformats.org/drawingml/2006/main" xmlns:r="http://schemas.openxmlformats.org/officeDocument/2006/relationships" xmlns:p="http://schemas.openxmlformats.org/presentationml/2006/main">
+  <p:cSld>
+    <p:spTree>
+      <p:nvGrpSpPr>
+        <p:cNvPr id="1" name=""/>
+        <p:cNvGrpSpPr/>
+        <p:nvPr/>
+      </p:nvGrpSpPr>
+      <p:grpSpPr>
+        <a:xfrm>
+          <a:off x="0" y="0"/>
+          <a:ext cx="0" cy="0"/>
+          <a:chOff x="0" y="0"/>
+          <a:chExt cx="0" cy="0"/>
+        </a:xfrm>
+      </p:grpSpPr>
+      <p:sp>
+        <p:nvSpPr>
+          <p:cNvPr id="2" name="Title 1"/>
+          <p:cNvSpPr>
+            <a:spLocks noGrp="1"/>
+          </p:cNvSpPr>
+          <p:nvPr>
+            <p:ph type="title"/>
+          </p:nvPr>
+        </p:nvSpPr>
+        <p:spPr/>
+        <p:txBody>
+          <a:bodyPr>
+            <a:normAutofit/>
+          </a:bodyPr>
+          <a:lstStyle/>
+          <a:p>
+            <a:r>
+              <a:rPr lang="en-IE" b="1" dirty="0" smtClean="0">
+                <a:solidFill>
+                  <a:schemeClr val="tx2"/>
+                </a:solidFill>
+              </a:rPr>
+              <a:t>Git Integration</a:t>
+            </a:r>
+            <a:endParaRPr lang="en-IE" b="1" dirty="0">
+              <a:solidFill>
+                <a:schemeClr val="tx2"/>
+              </a:solidFill>
+            </a:endParaRPr>
+          </a:p>
+        </p:txBody>
+      </p:sp>
+      <p:sp>
+        <p:nvSpPr>
+          <p:cNvPr id="3" name="Content Placeholder 2"/>
+          <p:cNvSpPr>
+            <a:spLocks noGrp="1"/>
+          </p:cNvSpPr>
+          <p:nvPr>
+            <p:ph idx="1"/>
+          </p:nvPr>
+        </p:nvSpPr>
+        <p:spPr>
+          <a:xfrm>
+            <a:off x="838200" y="1825625"/>
+            <a:ext cx="10515600" cy="2492375"/>
+          </a:xfrm>
+        </p:spPr>
+        <p:txBody>
+          <a:bodyPr>
+            <a:normAutofit/>
+          </a:bodyPr>
+          <a:lstStyle/>
+          <a:p>
+            <a:r>
+              <a:rPr lang="en-IE" dirty="0" smtClean="0">
+                <a:solidFill>
+                  <a:schemeClr val="tx2"/>
+                </a:solidFill>
+              </a:rPr>
+              <a:t>Git </a:t>
+            </a:r>
+            <a:r>
+              <a:rPr lang="en-IE" dirty="0" err="1" smtClean="0">
+                <a:solidFill>
+                  <a:schemeClr val="tx2"/>
+                </a:solidFill>
+              </a:rPr>
+              <a:t>Gui</a:t>
+            </a:r>
+            <a:endParaRPr lang="en-IE" dirty="0" smtClean="0">
+              <a:solidFill>
+                <a:schemeClr val="tx2"/>
+              </a:solidFill>
+            </a:endParaRPr>
+          </a:p>
+          <a:p>
+            <a:r>
+              <a:rPr lang="en-IE" dirty="0">
+                <a:solidFill>
+                  <a:schemeClr val="tx2"/>
+                </a:solidFill>
+              </a:rPr>
+              <a:t>Visual </a:t>
+            </a:r>
+            <a:r>
+              <a:rPr lang="en-IE" dirty="0" smtClean="0">
+                <a:solidFill>
+                  <a:schemeClr val="tx2"/>
+                </a:solidFill>
+              </a:rPr>
+              <a:t>Studio Tools</a:t>
+            </a:r>
+            <a:endParaRPr lang="en-IE" dirty="0">
+              <a:solidFill>
+                <a:schemeClr val="tx2"/>
+              </a:solidFill>
+            </a:endParaRPr>
+          </a:p>
+          <a:p>
+            <a:pPr marL="228600" lvl="1">
+              <a:spcBef>
+                <a:spcPts val="1000"/>
+              </a:spcBef>
+            </a:pPr>
+            <a:r>
+              <a:rPr lang="en-IE" sz="2800" dirty="0" err="1">
+                <a:solidFill>
+                  <a:schemeClr val="tx2"/>
+                </a:solidFill>
+              </a:rPr>
+              <a:t>GitHub</a:t>
+            </a:r>
+            <a:r>
+              <a:rPr lang="en-IE" sz="2800" dirty="0">
+                <a:solidFill>
+                  <a:schemeClr val="tx2"/>
+                </a:solidFill>
+              </a:rPr>
+              <a:t> on Windows</a:t>
+            </a:r>
+          </a:p>
+          <a:p>
+            <a:r>
+              <a:rPr lang="en-IE" dirty="0" smtClean="0">
+                <a:solidFill>
+                  <a:schemeClr val="tx2"/>
+                </a:solidFill>
+              </a:rPr>
+              <a:t>Posh-git</a:t>
+            </a:r>
+            <a:endParaRPr lang="en-IE" dirty="0">
+              <a:solidFill>
+                <a:schemeClr val="tx2"/>
+              </a:solidFill>
+            </a:endParaRPr>
+          </a:p>
+        </p:txBody>
+      </p:sp>
+      <p:pic>
+        <p:nvPicPr>
+          <p:cNvPr id="4" name="Picture 3"/>
+          <p:cNvPicPr>
+            <a:picLocks noChangeAspect="1"/>
+          </p:cNvPicPr>
+          <p:nvPr/>
+        </p:nvPicPr>
+        <p:blipFill>
+          <a:blip r:embed="rId2">
+            <a:extLst>
+              <a:ext uri="{28A0092B-C50C-407E-A947-70E740481C1C}">
+                <a14:useLocalDpi xmlns:a14="http://schemas.microsoft.com/office/drawing/2010/main" val="0"/>
+              </a:ext>
+            </a:extLst>
+          </a:blip>
+          <a:stretch>
+            <a:fillRect/>
+          </a:stretch>
+        </p:blipFill>
+        <p:spPr>
+          <a:xfrm>
+            <a:off x="9433135" y="169334"/>
+            <a:ext cx="2519681" cy="1049867"/>
+          </a:xfrm>
+          <a:prstGeom prst="rect">
+            <a:avLst/>
+          </a:prstGeom>
+        </p:spPr>
+      </p:pic>
+    </p:spTree>
+    <p:extLst>
+      <p:ext uri="{BB962C8B-B14F-4D97-AF65-F5344CB8AC3E}">
+        <p14:creationId xmlns:p14="http://schemas.microsoft.com/office/powerpoint/2010/main" val="221836001"/>
+      </p:ext>
+    </p:extLst>
+  </p:cSld>
+  <p:clrMapOvr>
+    <a:masterClrMapping/>
+  </p:clrMapOvr>
+  <p:timing>
+    <p:tnLst>
+      <p:par>
+        <p:cTn id="1" dur="indefinite" restart="never" nodeType="tmRoot"/>
+      </p:par>
+    </p:tnLst>
+  </p:timing>
+</p:sld>
+</file>
+
+<file path=ppt/slides/slide16.xml><?xml version="1.0" encoding="utf-8"?>
 <p:sld xmlns:a="http://schemas.openxmlformats.org/drawingml/2006/main" xmlns:r="http://schemas.openxmlformats.org/officeDocument/2006/relationships" xmlns:p="http://schemas.openxmlformats.org/presentationml/2006/main">
   <p:cSld>
     <p:spTree>
@@ -5364,7 +6060,7 @@
 </p:sld>
 </file>
 
-<file path=ppt/slides/slide15.xml><?xml version="1.0" encoding="utf-8"?>
+<file path=ppt/slides/slide17.xml><?xml version="1.0" encoding="utf-8"?>
 <p:sld xmlns:a="http://schemas.openxmlformats.org/drawingml/2006/main" xmlns:r="http://schemas.openxmlformats.org/officeDocument/2006/relationships" xmlns:p="http://schemas.openxmlformats.org/presentationml/2006/main">
   <p:cSld>
     <p:spTree>
@@ -5969,7 +6665,7 @@
 </p:sld>
 </file>
 
-<file path=ppt/slides/slide16.xml><?xml version="1.0" encoding="utf-8"?>
+<file path=ppt/slides/slide18.xml><?xml version="1.0" encoding="utf-8"?>
 <p:sld xmlns:a="http://schemas.openxmlformats.org/drawingml/2006/main" xmlns:r="http://schemas.openxmlformats.org/officeDocument/2006/relationships" xmlns:p="http://schemas.openxmlformats.org/presentationml/2006/main">
   <p:cSld>
     <p:spTree>
@@ -6072,8 +6768,31 @@
                   <a:schemeClr val="tx2"/>
                 </a:solidFill>
               </a:rPr>
-              <a:t>Remote branches</a:t>
-            </a:r>
+              <a:t>Remote </a:t>
+            </a:r>
+            <a:r>
+              <a:rPr lang="en-IE" dirty="0" smtClean="0">
+                <a:solidFill>
+                  <a:schemeClr val="tx2"/>
+                </a:solidFill>
+              </a:rPr>
+              <a:t>branches</a:t>
+            </a:r>
+          </a:p>
+          <a:p>
+            <a:r>
+              <a:rPr lang="en-IE" b="1" dirty="0">
+                <a:solidFill>
+                  <a:srgbClr val="FF0000"/>
+                </a:solidFill>
+              </a:rPr>
+              <a:t>Demo</a:t>
+            </a:r>
+          </a:p>
+          <a:p>
+            <a:pPr marL="0" indent="0">
+              <a:buNone/>
+            </a:pPr>
             <a:endParaRPr lang="en-IE" dirty="0" smtClean="0">
               <a:solidFill>
                 <a:schemeClr val="tx2"/>
@@ -6138,7 +6857,7 @@
 </p:sld>
 </file>
 
-<file path=ppt/slides/slide17.xml><?xml version="1.0" encoding="utf-8"?>
+<file path=ppt/slides/slide19.xml><?xml version="1.0" encoding="utf-8"?>
 <p:sld xmlns:a="http://schemas.openxmlformats.org/drawingml/2006/main" xmlns:r="http://schemas.openxmlformats.org/officeDocument/2006/relationships" xmlns:p="http://schemas.openxmlformats.org/presentationml/2006/main">
   <p:cSld>
     <p:spTree>
@@ -6416,7 +7135,7 @@
 </p:sld>
 </file>
 
-<file path=ppt/slides/slide18.xml><?xml version="1.0" encoding="utf-8"?>
+<file path=ppt/slides/slide2.xml><?xml version="1.0" encoding="utf-8"?>
 <p:sld xmlns:a="http://schemas.openxmlformats.org/drawingml/2006/main" xmlns:r="http://schemas.openxmlformats.org/officeDocument/2006/relationships" xmlns:p="http://schemas.openxmlformats.org/presentationml/2006/main">
   <p:cSld>
     <p:spTree>
@@ -6445,6 +7164,429 @@
         </p:nvSpPr>
         <p:spPr/>
         <p:txBody>
+          <a:bodyPr/>
+          <a:lstStyle/>
+          <a:p>
+            <a:r>
+              <a:rPr lang="en-IE" b="1" dirty="0">
+                <a:solidFill>
+                  <a:schemeClr val="tx2"/>
+                </a:solidFill>
+              </a:rPr>
+              <a:t>Agenda</a:t>
+            </a:r>
+          </a:p>
+        </p:txBody>
+      </p:sp>
+      <p:sp>
+        <p:nvSpPr>
+          <p:cNvPr id="3" name="Text Placeholder 2"/>
+          <p:cNvSpPr>
+            <a:spLocks noGrp="1"/>
+          </p:cNvSpPr>
+          <p:nvPr>
+            <p:ph type="body" idx="1"/>
+          </p:nvPr>
+        </p:nvSpPr>
+        <p:spPr>
+          <a:xfrm>
+            <a:off x="839788" y="1350238"/>
+            <a:ext cx="5157787" cy="823912"/>
+          </a:xfrm>
+        </p:spPr>
+        <p:txBody>
+          <a:bodyPr/>
+          <a:lstStyle/>
+          <a:p>
+            <a:r>
+              <a:rPr lang="en-IE" dirty="0" smtClean="0">
+                <a:solidFill>
+                  <a:schemeClr val="tx2"/>
+                </a:solidFill>
+              </a:rPr>
+              <a:t>Day 1</a:t>
+            </a:r>
+            <a:endParaRPr lang="en-IE" dirty="0">
+              <a:solidFill>
+                <a:schemeClr val="tx2"/>
+              </a:solidFill>
+            </a:endParaRPr>
+          </a:p>
+        </p:txBody>
+      </p:sp>
+      <p:sp>
+        <p:nvSpPr>
+          <p:cNvPr id="4" name="Content Placeholder 3"/>
+          <p:cNvSpPr>
+            <a:spLocks noGrp="1"/>
+          </p:cNvSpPr>
+          <p:nvPr>
+            <p:ph sz="half" idx="2"/>
+          </p:nvPr>
+        </p:nvSpPr>
+        <p:spPr/>
+        <p:txBody>
+          <a:bodyPr/>
+          <a:lstStyle/>
+          <a:p>
+            <a:r>
+              <a:rPr lang="en-IE" dirty="0">
+                <a:solidFill>
+                  <a:schemeClr val="tx2"/>
+                </a:solidFill>
+              </a:rPr>
+              <a:t>Getting to know Git</a:t>
+            </a:r>
+          </a:p>
+          <a:p>
+            <a:r>
+              <a:rPr lang="en-IE" dirty="0">
+                <a:solidFill>
+                  <a:schemeClr val="tx2"/>
+                </a:solidFill>
+              </a:rPr>
+              <a:t>Working with Git locally</a:t>
+            </a:r>
+          </a:p>
+          <a:p>
+            <a:r>
+              <a:rPr lang="en-IE" dirty="0" smtClean="0">
+                <a:solidFill>
+                  <a:schemeClr val="tx2"/>
+                </a:solidFill>
+              </a:rPr>
+              <a:t>Git integration</a:t>
+            </a:r>
+          </a:p>
+          <a:p>
+            <a:pPr lvl="1"/>
+            <a:r>
+              <a:rPr lang="en-IE" dirty="0" smtClean="0">
+                <a:solidFill>
+                  <a:schemeClr val="tx2"/>
+                </a:solidFill>
+              </a:rPr>
+              <a:t>Git </a:t>
+            </a:r>
+            <a:r>
+              <a:rPr lang="en-IE" dirty="0" err="1" smtClean="0">
+                <a:solidFill>
+                  <a:schemeClr val="tx2"/>
+                </a:solidFill>
+              </a:rPr>
+              <a:t>Gui</a:t>
+            </a:r>
+            <a:endParaRPr lang="en-IE" dirty="0" smtClean="0">
+              <a:solidFill>
+                <a:schemeClr val="tx2"/>
+              </a:solidFill>
+            </a:endParaRPr>
+          </a:p>
+          <a:p>
+            <a:pPr lvl="1"/>
+            <a:r>
+              <a:rPr lang="en-IE" dirty="0">
+                <a:solidFill>
+                  <a:schemeClr val="tx2"/>
+                </a:solidFill>
+              </a:rPr>
+              <a:t>Visual Studio Tools for </a:t>
+            </a:r>
+            <a:r>
+              <a:rPr lang="en-IE" dirty="0" smtClean="0">
+                <a:solidFill>
+                  <a:schemeClr val="tx2"/>
+                </a:solidFill>
+              </a:rPr>
+              <a:t>Git</a:t>
+            </a:r>
+          </a:p>
+          <a:p>
+            <a:r>
+              <a:rPr lang="en-IE" dirty="0" smtClean="0">
+                <a:solidFill>
+                  <a:schemeClr val="tx2"/>
+                </a:solidFill>
+              </a:rPr>
+              <a:t>Git and TFS</a:t>
+            </a:r>
+          </a:p>
+          <a:p>
+            <a:r>
+              <a:rPr lang="en-IE" dirty="0" smtClean="0">
+                <a:solidFill>
+                  <a:schemeClr val="tx2"/>
+                </a:solidFill>
+              </a:rPr>
+              <a:t>Git and Multimedia</a:t>
+            </a:r>
+            <a:endParaRPr lang="en-IE" dirty="0">
+              <a:solidFill>
+                <a:schemeClr val="tx2"/>
+              </a:solidFill>
+            </a:endParaRPr>
+          </a:p>
+          <a:p>
+            <a:pPr lvl="1"/>
+            <a:endParaRPr lang="en-IE" dirty="0">
+              <a:solidFill>
+                <a:schemeClr val="tx2"/>
+              </a:solidFill>
+            </a:endParaRPr>
+          </a:p>
+          <a:p>
+            <a:pPr marL="0" indent="0">
+              <a:buNone/>
+            </a:pPr>
+            <a:endParaRPr lang="en-IE" dirty="0">
+              <a:solidFill>
+                <a:schemeClr val="tx2"/>
+              </a:solidFill>
+            </a:endParaRPr>
+          </a:p>
+        </p:txBody>
+      </p:sp>
+      <p:sp>
+        <p:nvSpPr>
+          <p:cNvPr id="5" name="Text Placeholder 4"/>
+          <p:cNvSpPr>
+            <a:spLocks noGrp="1"/>
+          </p:cNvSpPr>
+          <p:nvPr>
+            <p:ph type="body" sz="quarter" idx="3"/>
+          </p:nvPr>
+        </p:nvSpPr>
+        <p:spPr>
+          <a:xfrm>
+            <a:off x="6172200" y="1350238"/>
+            <a:ext cx="5183188" cy="823912"/>
+          </a:xfrm>
+        </p:spPr>
+        <p:txBody>
+          <a:bodyPr/>
+          <a:lstStyle/>
+          <a:p>
+            <a:r>
+              <a:rPr lang="en-IE" dirty="0" smtClean="0">
+                <a:solidFill>
+                  <a:schemeClr val="tx2"/>
+                </a:solidFill>
+              </a:rPr>
+              <a:t>Day 2</a:t>
+            </a:r>
+            <a:endParaRPr lang="en-IE" dirty="0">
+              <a:solidFill>
+                <a:schemeClr val="tx2"/>
+              </a:solidFill>
+            </a:endParaRPr>
+          </a:p>
+        </p:txBody>
+      </p:sp>
+      <p:sp>
+        <p:nvSpPr>
+          <p:cNvPr id="6" name="Content Placeholder 5"/>
+          <p:cNvSpPr>
+            <a:spLocks noGrp="1"/>
+          </p:cNvSpPr>
+          <p:nvPr>
+            <p:ph sz="quarter" idx="4"/>
+          </p:nvPr>
+        </p:nvSpPr>
+        <p:spPr/>
+        <p:txBody>
+          <a:bodyPr>
+            <a:normAutofit/>
+          </a:bodyPr>
+          <a:lstStyle/>
+          <a:p>
+            <a:r>
+              <a:rPr lang="en-IE" dirty="0" smtClean="0">
+                <a:solidFill>
+                  <a:schemeClr val="tx2"/>
+                </a:solidFill>
+              </a:rPr>
+              <a:t>Recap</a:t>
+            </a:r>
+            <a:endParaRPr lang="en-IE" dirty="0">
+              <a:solidFill>
+                <a:schemeClr val="tx2"/>
+              </a:solidFill>
+            </a:endParaRPr>
+          </a:p>
+          <a:p>
+            <a:r>
+              <a:rPr lang="en-IE" dirty="0">
+                <a:solidFill>
+                  <a:schemeClr val="tx2"/>
+                </a:solidFill>
+              </a:rPr>
+              <a:t>Working with Git </a:t>
+            </a:r>
+            <a:r>
+              <a:rPr lang="en-IE" dirty="0" smtClean="0">
+                <a:solidFill>
+                  <a:schemeClr val="tx2"/>
+                </a:solidFill>
+              </a:rPr>
+              <a:t>remotely</a:t>
+            </a:r>
+          </a:p>
+          <a:p>
+            <a:r>
+              <a:rPr lang="en-IE" dirty="0" err="1" smtClean="0">
+                <a:solidFill>
+                  <a:schemeClr val="tx2"/>
+                </a:solidFill>
+              </a:rPr>
+              <a:t>GitHub</a:t>
+            </a:r>
+            <a:endParaRPr lang="en-IE" dirty="0">
+              <a:solidFill>
+                <a:schemeClr val="tx2"/>
+              </a:solidFill>
+            </a:endParaRPr>
+          </a:p>
+          <a:p>
+            <a:r>
+              <a:rPr lang="en-IE" dirty="0" err="1">
+                <a:solidFill>
+                  <a:schemeClr val="tx2"/>
+                </a:solidFill>
+              </a:rPr>
+              <a:t>GitHub</a:t>
+            </a:r>
+            <a:r>
+              <a:rPr lang="en-IE" dirty="0">
+                <a:solidFill>
+                  <a:schemeClr val="tx2"/>
+                </a:solidFill>
+              </a:rPr>
+              <a:t> for Windows</a:t>
+            </a:r>
+          </a:p>
+          <a:p>
+            <a:r>
+              <a:rPr lang="en-IE" dirty="0">
+                <a:solidFill>
+                  <a:schemeClr val="tx2"/>
+                </a:solidFill>
+              </a:rPr>
+              <a:t>Branching and </a:t>
+            </a:r>
+            <a:r>
+              <a:rPr lang="en-IE" dirty="0" smtClean="0">
+                <a:solidFill>
+                  <a:schemeClr val="tx2"/>
+                </a:solidFill>
+              </a:rPr>
+              <a:t>Merging</a:t>
+            </a:r>
+          </a:p>
+          <a:p>
+            <a:r>
+              <a:rPr lang="en-IE" dirty="0" smtClean="0">
+                <a:solidFill>
+                  <a:schemeClr val="tx2"/>
+                </a:solidFill>
+              </a:rPr>
+              <a:t>Git internals</a:t>
+            </a:r>
+          </a:p>
+          <a:p>
+            <a:r>
+              <a:rPr lang="en-IE" dirty="0" smtClean="0">
+                <a:solidFill>
+                  <a:schemeClr val="tx2"/>
+                </a:solidFill>
+              </a:rPr>
+              <a:t>Resources</a:t>
+            </a:r>
+            <a:endParaRPr lang="en-IE" dirty="0" smtClean="0"/>
+          </a:p>
+          <a:p>
+            <a:endParaRPr lang="en-IE" dirty="0"/>
+          </a:p>
+        </p:txBody>
+      </p:sp>
+      <p:pic>
+        <p:nvPicPr>
+          <p:cNvPr id="7" name="Picture 6"/>
+          <p:cNvPicPr>
+            <a:picLocks noChangeAspect="1"/>
+          </p:cNvPicPr>
+          <p:nvPr/>
+        </p:nvPicPr>
+        <p:blipFill>
+          <a:blip r:embed="rId2">
+            <a:extLst>
+              <a:ext uri="{28A0092B-C50C-407E-A947-70E740481C1C}">
+                <a14:useLocalDpi xmlns:a14="http://schemas.microsoft.com/office/drawing/2010/main" val="0"/>
+              </a:ext>
+            </a:extLst>
+          </a:blip>
+          <a:stretch>
+            <a:fillRect/>
+          </a:stretch>
+        </p:blipFill>
+        <p:spPr>
+          <a:xfrm>
+            <a:off x="9433135" y="169334"/>
+            <a:ext cx="2519681" cy="1049867"/>
+          </a:xfrm>
+          <a:prstGeom prst="rect">
+            <a:avLst/>
+          </a:prstGeom>
+        </p:spPr>
+      </p:pic>
+    </p:spTree>
+    <p:extLst>
+      <p:ext uri="{BB962C8B-B14F-4D97-AF65-F5344CB8AC3E}">
+        <p14:creationId xmlns:p14="http://schemas.microsoft.com/office/powerpoint/2010/main" val="1737230421"/>
+      </p:ext>
+    </p:extLst>
+  </p:cSld>
+  <p:clrMapOvr>
+    <a:masterClrMapping/>
+  </p:clrMapOvr>
+  <p:timing>
+    <p:tnLst>
+      <p:par>
+        <p:cTn id="1" dur="indefinite" restart="never" nodeType="tmRoot"/>
+      </p:par>
+    </p:tnLst>
+  </p:timing>
+</p:sld>
+</file>
+
+<file path=ppt/slides/slide20.xml><?xml version="1.0" encoding="utf-8"?>
+<p:sld xmlns:a="http://schemas.openxmlformats.org/drawingml/2006/main" xmlns:r="http://schemas.openxmlformats.org/officeDocument/2006/relationships" xmlns:p="http://schemas.openxmlformats.org/presentationml/2006/main">
+  <p:cSld>
+    <p:spTree>
+      <p:nvGrpSpPr>
+        <p:cNvPr id="1" name=""/>
+        <p:cNvGrpSpPr/>
+        <p:nvPr/>
+      </p:nvGrpSpPr>
+      <p:grpSpPr>
+        <a:xfrm>
+          <a:off x="0" y="0"/>
+          <a:ext cx="0" cy="0"/>
+          <a:chOff x="0" y="0"/>
+          <a:chExt cx="0" cy="0"/>
+        </a:xfrm>
+      </p:grpSpPr>
+      <p:sp>
+        <p:nvSpPr>
+          <p:cNvPr id="2" name="Title 1"/>
+          <p:cNvSpPr>
+            <a:spLocks noGrp="1"/>
+          </p:cNvSpPr>
+          <p:nvPr>
+            <p:ph type="title"/>
+          </p:nvPr>
+        </p:nvSpPr>
+        <p:spPr/>
+        <p:txBody>
           <a:bodyPr>
             <a:normAutofit/>
           </a:bodyPr>
@@ -6489,7 +7631,147 @@
                   <a:schemeClr val="tx2"/>
                 </a:solidFill>
               </a:rPr>
-              <a:t>TODO</a:t>
+              <a:t>When Git stores a new version of a project</a:t>
+            </a:r>
+          </a:p>
+          <a:p>
+            <a:pPr marL="0" indent="0">
+              <a:buNone/>
+            </a:pPr>
+            <a:r>
+              <a:rPr lang="en-IE" dirty="0" smtClean="0">
+                <a:solidFill>
+                  <a:schemeClr val="tx2"/>
+                </a:solidFill>
+              </a:rPr>
+              <a:t> it stores a new tree</a:t>
+            </a:r>
+          </a:p>
+          <a:p>
+            <a:endParaRPr lang="en-IE" dirty="0" smtClean="0">
+              <a:solidFill>
+                <a:schemeClr val="tx2"/>
+              </a:solidFill>
+            </a:endParaRPr>
+          </a:p>
+          <a:p>
+            <a:r>
+              <a:rPr lang="en-IE" dirty="0" smtClean="0">
+                <a:solidFill>
+                  <a:schemeClr val="tx2"/>
+                </a:solidFill>
+              </a:rPr>
+              <a:t> A </a:t>
+            </a:r>
+            <a:r>
+              <a:rPr lang="en-IE" dirty="0">
+                <a:solidFill>
+                  <a:schemeClr val="tx2"/>
+                </a:solidFill>
+              </a:rPr>
+              <a:t>bunch of </a:t>
+            </a:r>
+            <a:r>
+              <a:rPr lang="en-IE" dirty="0">
+                <a:solidFill>
+                  <a:schemeClr val="tx2"/>
+                </a:solidFill>
+              </a:rPr>
+              <a:t>blobs of content and a </a:t>
+            </a:r>
+            <a:endParaRPr lang="en-IE" dirty="0" smtClean="0">
+              <a:solidFill>
+                <a:schemeClr val="tx2"/>
+              </a:solidFill>
+            </a:endParaRPr>
+          </a:p>
+          <a:p>
+            <a:pPr marL="0" indent="0">
+              <a:buNone/>
+            </a:pPr>
+            <a:r>
+              <a:rPr lang="en-IE" dirty="0" smtClean="0">
+                <a:solidFill>
+                  <a:schemeClr val="tx2"/>
+                </a:solidFill>
+              </a:rPr>
+              <a:t>collection </a:t>
+            </a:r>
+            <a:r>
+              <a:rPr lang="en-IE" dirty="0">
+                <a:solidFill>
+                  <a:schemeClr val="tx2"/>
+                </a:solidFill>
+              </a:rPr>
+              <a:t>of </a:t>
+            </a:r>
+            <a:r>
+              <a:rPr lang="en-IE" dirty="0">
+                <a:solidFill>
+                  <a:schemeClr val="tx2"/>
+                </a:solidFill>
+              </a:rPr>
+              <a:t>pointers </a:t>
+            </a:r>
+            <a:r>
+              <a:rPr lang="en-IE" dirty="0">
+                <a:solidFill>
+                  <a:schemeClr val="tx2"/>
+                </a:solidFill>
+              </a:rPr>
+              <a:t>that can be expanded </a:t>
+            </a:r>
+            <a:endParaRPr lang="en-IE" dirty="0" smtClean="0">
+              <a:solidFill>
+                <a:schemeClr val="tx2"/>
+              </a:solidFill>
+            </a:endParaRPr>
+          </a:p>
+          <a:p>
+            <a:pPr marL="0" indent="0">
+              <a:buNone/>
+            </a:pPr>
+            <a:r>
+              <a:rPr lang="en-IE" dirty="0" smtClean="0">
+                <a:solidFill>
+                  <a:schemeClr val="tx2"/>
+                </a:solidFill>
+              </a:rPr>
+              <a:t>back </a:t>
+            </a:r>
+            <a:r>
+              <a:rPr lang="en-IE" dirty="0">
+                <a:solidFill>
+                  <a:schemeClr val="tx2"/>
+                </a:solidFill>
+              </a:rPr>
+              <a:t>out into a full directory of files </a:t>
+            </a:r>
+            <a:r>
+              <a:rPr lang="en-IE" dirty="0">
+                <a:solidFill>
+                  <a:schemeClr val="tx2"/>
+                </a:solidFill>
+              </a:rPr>
+              <a:t>and </a:t>
+            </a:r>
+            <a:endParaRPr lang="en-IE" dirty="0" smtClean="0">
+              <a:solidFill>
+                <a:schemeClr val="tx2"/>
+              </a:solidFill>
+            </a:endParaRPr>
+          </a:p>
+          <a:p>
+            <a:pPr marL="0" indent="0">
+              <a:buNone/>
+            </a:pPr>
+            <a:r>
+              <a:rPr lang="en-IE" dirty="0" smtClean="0">
+                <a:solidFill>
+                  <a:schemeClr val="tx2"/>
+                </a:solidFill>
+              </a:rPr>
+              <a:t>subdirectories</a:t>
             </a:r>
             <a:endParaRPr lang="en-IE" dirty="0">
               <a:solidFill>
@@ -6498,7 +7780,247 @@
             </a:endParaRPr>
           </a:p>
           <a:p>
+            <a:pPr marL="0" indent="0">
+              <a:buNone/>
+            </a:pPr>
+            <a:endParaRPr lang="en-IE" dirty="0" smtClean="0">
+              <a:solidFill>
+                <a:schemeClr val="tx2"/>
+              </a:solidFill>
+            </a:endParaRPr>
+          </a:p>
+          <a:p>
+            <a:pPr marL="0" indent="0">
+              <a:buNone/>
+            </a:pPr>
+            <a:endParaRPr lang="en-IE" dirty="0"/>
+          </a:p>
+        </p:txBody>
+      </p:sp>
+      <p:pic>
+        <p:nvPicPr>
+          <p:cNvPr id="4" name="Picture 3"/>
+          <p:cNvPicPr>
+            <a:picLocks noChangeAspect="1"/>
+          </p:cNvPicPr>
+          <p:nvPr/>
+        </p:nvPicPr>
+        <p:blipFill>
+          <a:blip r:embed="rId2">
+            <a:extLst>
+              <a:ext uri="{28A0092B-C50C-407E-A947-70E740481C1C}">
+                <a14:useLocalDpi xmlns:a14="http://schemas.microsoft.com/office/drawing/2010/main" val="0"/>
+              </a:ext>
+            </a:extLst>
+          </a:blip>
+          <a:stretch>
+            <a:fillRect/>
+          </a:stretch>
+        </p:blipFill>
+        <p:spPr>
+          <a:xfrm>
+            <a:off x="9433135" y="169334"/>
+            <a:ext cx="2519681" cy="1049867"/>
+          </a:xfrm>
+          <a:prstGeom prst="rect">
+            <a:avLst/>
+          </a:prstGeom>
+        </p:spPr>
+      </p:pic>
+      <p:pic>
+        <p:nvPicPr>
+          <p:cNvPr id="6" name="Picture 5"/>
+          <p:cNvPicPr>
+            <a:picLocks noChangeAspect="1"/>
+          </p:cNvPicPr>
+          <p:nvPr/>
+        </p:nvPicPr>
+        <p:blipFill>
+          <a:blip r:embed="rId3"/>
+          <a:stretch>
+            <a:fillRect/>
+          </a:stretch>
+        </p:blipFill>
+        <p:spPr>
+          <a:xfrm>
+            <a:off x="7947128" y="1774825"/>
+            <a:ext cx="3451360" cy="3576108"/>
+          </a:xfrm>
+          <a:prstGeom prst="rect">
+            <a:avLst/>
+          </a:prstGeom>
+        </p:spPr>
+      </p:pic>
+    </p:spTree>
+    <p:extLst>
+      <p:ext uri="{BB962C8B-B14F-4D97-AF65-F5344CB8AC3E}">
+        <p14:creationId xmlns:p14="http://schemas.microsoft.com/office/powerpoint/2010/main" val="1443498136"/>
+      </p:ext>
+    </p:extLst>
+  </p:cSld>
+  <p:clrMapOvr>
+    <a:masterClrMapping/>
+  </p:clrMapOvr>
+  <p:timing>
+    <p:tnLst>
+      <p:par>
+        <p:cTn id="1" dur="indefinite" restart="never" nodeType="tmRoot"/>
+      </p:par>
+    </p:tnLst>
+  </p:timing>
+</p:sld>
+</file>
+
+<file path=ppt/slides/slide21.xml><?xml version="1.0" encoding="utf-8"?>
+<p:sld xmlns:a="http://schemas.openxmlformats.org/drawingml/2006/main" xmlns:r="http://schemas.openxmlformats.org/officeDocument/2006/relationships" xmlns:p="http://schemas.openxmlformats.org/presentationml/2006/main">
+  <p:cSld>
+    <p:spTree>
+      <p:nvGrpSpPr>
+        <p:cNvPr id="1" name=""/>
+        <p:cNvGrpSpPr/>
+        <p:nvPr/>
+      </p:nvGrpSpPr>
+      <p:grpSpPr>
+        <a:xfrm>
+          <a:off x="0" y="0"/>
+          <a:ext cx="0" cy="0"/>
+          <a:chOff x="0" y="0"/>
+          <a:chExt cx="0" cy="0"/>
+        </a:xfrm>
+      </p:grpSpPr>
+      <p:sp>
+        <p:nvSpPr>
+          <p:cNvPr id="2" name="Title 1"/>
+          <p:cNvSpPr>
+            <a:spLocks noGrp="1"/>
+          </p:cNvSpPr>
+          <p:nvPr>
+            <p:ph type="title"/>
+          </p:nvPr>
+        </p:nvSpPr>
+        <p:spPr/>
+        <p:txBody>
+          <a:bodyPr>
+            <a:normAutofit/>
+          </a:bodyPr>
+          <a:lstStyle/>
+          <a:p>
+            <a:r>
+              <a:rPr lang="en-IE" b="1" dirty="0" smtClean="0">
+                <a:solidFill>
+                  <a:schemeClr val="tx2"/>
+                </a:solidFill>
+              </a:rPr>
+              <a:t>Git internals</a:t>
+            </a:r>
+            <a:endParaRPr lang="en-IE" b="1" dirty="0">
+              <a:solidFill>
+                <a:schemeClr val="tx2"/>
+              </a:solidFill>
+            </a:endParaRPr>
+          </a:p>
+        </p:txBody>
+      </p:sp>
+      <p:sp>
+        <p:nvSpPr>
+          <p:cNvPr id="3" name="Content Placeholder 2"/>
+          <p:cNvSpPr>
+            <a:spLocks noGrp="1"/>
+          </p:cNvSpPr>
+          <p:nvPr>
+            <p:ph idx="1"/>
+          </p:nvPr>
+        </p:nvSpPr>
+        <p:spPr/>
+        <p:txBody>
+          <a:bodyPr>
+            <a:normAutofit/>
+          </a:bodyPr>
+          <a:lstStyle/>
+          <a:p>
+            <a:r>
+              <a:rPr lang="en-IE" dirty="0" smtClean="0">
+                <a:solidFill>
+                  <a:schemeClr val="tx2"/>
+                </a:solidFill>
+              </a:rPr>
+              <a:t>Four </a:t>
+            </a:r>
+            <a:r>
+              <a:rPr lang="en-IE" dirty="0">
+                <a:solidFill>
+                  <a:schemeClr val="tx2"/>
+                </a:solidFill>
+              </a:rPr>
+              <a:t>main </a:t>
+            </a:r>
+            <a:r>
+              <a:rPr lang="en-IE" dirty="0">
+                <a:solidFill>
+                  <a:schemeClr val="tx2"/>
+                </a:solidFill>
+              </a:rPr>
+              <a:t>objects types in Git</a:t>
+            </a:r>
+            <a:endParaRPr lang="en-IE" dirty="0">
+              <a:solidFill>
+                <a:schemeClr val="tx2"/>
+              </a:solidFill>
+            </a:endParaRPr>
+          </a:p>
+          <a:p>
             <a:pPr lvl="1"/>
+            <a:r>
+              <a:rPr lang="en-IE" sz="2800" dirty="0" smtClean="0">
+                <a:solidFill>
+                  <a:schemeClr val="tx2"/>
+                </a:solidFill>
+              </a:rPr>
+              <a:t>Blob</a:t>
+            </a:r>
+          </a:p>
+          <a:p>
+            <a:pPr lvl="1"/>
+            <a:r>
+              <a:rPr lang="en-IE" sz="2800" dirty="0" smtClean="0">
+                <a:solidFill>
+                  <a:schemeClr val="tx2"/>
+                </a:solidFill>
+              </a:rPr>
+              <a:t>Tree</a:t>
+            </a:r>
+          </a:p>
+          <a:p>
+            <a:pPr lvl="1"/>
+            <a:r>
+              <a:rPr lang="en-IE" sz="2800" dirty="0" smtClean="0">
+                <a:solidFill>
+                  <a:schemeClr val="tx2"/>
+                </a:solidFill>
+              </a:rPr>
+              <a:t>Commit</a:t>
+            </a:r>
+          </a:p>
+          <a:p>
+            <a:pPr lvl="1"/>
+            <a:r>
+              <a:rPr lang="en-IE" sz="2800" dirty="0" smtClean="0">
+                <a:solidFill>
+                  <a:schemeClr val="tx2"/>
+                </a:solidFill>
+              </a:rPr>
+              <a:t>Tag</a:t>
+            </a:r>
+            <a:endParaRPr lang="en-IE" sz="2800" dirty="0">
+              <a:solidFill>
+                <a:schemeClr val="tx2"/>
+              </a:solidFill>
+            </a:endParaRPr>
+          </a:p>
+          <a:p>
+            <a:pPr marL="0" indent="0">
+              <a:buNone/>
+            </a:pPr>
             <a:endParaRPr lang="en-IE" dirty="0" smtClean="0">
               <a:solidFill>
                 <a:schemeClr val="tx2"/>
@@ -6546,7 +8068,7 @@
     </p:spTree>
     <p:extLst>
       <p:ext uri="{BB962C8B-B14F-4D97-AF65-F5344CB8AC3E}">
-        <p14:creationId xmlns:p14="http://schemas.microsoft.com/office/powerpoint/2010/main" val="1443498136"/>
+        <p14:creationId xmlns:p14="http://schemas.microsoft.com/office/powerpoint/2010/main" val="4198363091"/>
       </p:ext>
     </p:extLst>
   </p:cSld>
@@ -6563,7 +8085,7 @@
 </p:sld>
 </file>
 
-<file path=ppt/slides/slide19.xml><?xml version="1.0" encoding="utf-8"?>
+<file path=ppt/slides/slide22.xml><?xml version="1.0" encoding="utf-8"?>
 <p:sld xmlns:a="http://schemas.openxmlformats.org/drawingml/2006/main" xmlns:r="http://schemas.openxmlformats.org/officeDocument/2006/relationships" xmlns:p="http://schemas.openxmlformats.org/presentationml/2006/main">
   <p:cSld>
     <p:spTree>
@@ -6603,6 +8125,687 @@
                   <a:schemeClr val="tx2"/>
                 </a:solidFill>
               </a:rPr>
+              <a:t>Blob</a:t>
+            </a:r>
+            <a:endParaRPr lang="en-IE" b="1" dirty="0">
+              <a:solidFill>
+                <a:schemeClr val="tx2"/>
+              </a:solidFill>
+            </a:endParaRPr>
+          </a:p>
+        </p:txBody>
+      </p:sp>
+      <p:sp>
+        <p:nvSpPr>
+          <p:cNvPr id="3" name="Content Placeholder 2"/>
+          <p:cNvSpPr>
+            <a:spLocks noGrp="1"/>
+          </p:cNvSpPr>
+          <p:nvPr>
+            <p:ph idx="1"/>
+          </p:nvPr>
+        </p:nvSpPr>
+        <p:spPr/>
+        <p:txBody>
+          <a:bodyPr>
+            <a:normAutofit/>
+          </a:bodyPr>
+          <a:lstStyle/>
+          <a:p>
+            <a:r>
+              <a:rPr lang="en-IE" sz="2800" dirty="0" smtClean="0">
+                <a:solidFill>
+                  <a:schemeClr val="tx2"/>
+                </a:solidFill>
+              </a:rPr>
+              <a:t>Contents of files</a:t>
+            </a:r>
+            <a:endParaRPr lang="en-IE" dirty="0" smtClean="0">
+              <a:solidFill>
+                <a:schemeClr val="tx2"/>
+              </a:solidFill>
+            </a:endParaRPr>
+          </a:p>
+          <a:p>
+            <a:pPr marL="0" indent="0">
+              <a:buNone/>
+            </a:pPr>
+            <a:endParaRPr lang="en-IE" dirty="0"/>
+          </a:p>
+        </p:txBody>
+      </p:sp>
+      <p:pic>
+        <p:nvPicPr>
+          <p:cNvPr id="4" name="Picture 3"/>
+          <p:cNvPicPr>
+            <a:picLocks noChangeAspect="1"/>
+          </p:cNvPicPr>
+          <p:nvPr/>
+        </p:nvPicPr>
+        <p:blipFill>
+          <a:blip r:embed="rId2">
+            <a:extLst>
+              <a:ext uri="{28A0092B-C50C-407E-A947-70E740481C1C}">
+                <a14:useLocalDpi xmlns:a14="http://schemas.microsoft.com/office/drawing/2010/main" val="0"/>
+              </a:ext>
+            </a:extLst>
+          </a:blip>
+          <a:stretch>
+            <a:fillRect/>
+          </a:stretch>
+        </p:blipFill>
+        <p:spPr>
+          <a:xfrm>
+            <a:off x="9433135" y="169334"/>
+            <a:ext cx="2519681" cy="1049867"/>
+          </a:xfrm>
+          <a:prstGeom prst="rect">
+            <a:avLst/>
+          </a:prstGeom>
+        </p:spPr>
+      </p:pic>
+      <p:pic>
+        <p:nvPicPr>
+          <p:cNvPr id="5" name="Picture 4"/>
+          <p:cNvPicPr>
+            <a:picLocks noChangeAspect="1"/>
+          </p:cNvPicPr>
+          <p:nvPr/>
+        </p:nvPicPr>
+        <p:blipFill>
+          <a:blip r:embed="rId3"/>
+          <a:stretch>
+            <a:fillRect/>
+          </a:stretch>
+        </p:blipFill>
+        <p:spPr>
+          <a:xfrm>
+            <a:off x="1899283" y="2428080"/>
+            <a:ext cx="7390341" cy="3159919"/>
+          </a:xfrm>
+          <a:prstGeom prst="rect">
+            <a:avLst/>
+          </a:prstGeom>
+        </p:spPr>
+      </p:pic>
+    </p:spTree>
+    <p:extLst>
+      <p:ext uri="{BB962C8B-B14F-4D97-AF65-F5344CB8AC3E}">
+        <p14:creationId xmlns:p14="http://schemas.microsoft.com/office/powerpoint/2010/main" val="3096877789"/>
+      </p:ext>
+    </p:extLst>
+  </p:cSld>
+  <p:clrMapOvr>
+    <a:masterClrMapping/>
+  </p:clrMapOvr>
+  <p:timing>
+    <p:tnLst>
+      <p:par>
+        <p:cTn id="1" dur="indefinite" restart="never" nodeType="tmRoot"/>
+      </p:par>
+    </p:tnLst>
+  </p:timing>
+</p:sld>
+</file>
+
+<file path=ppt/slides/slide23.xml><?xml version="1.0" encoding="utf-8"?>
+<p:sld xmlns:a="http://schemas.openxmlformats.org/drawingml/2006/main" xmlns:r="http://schemas.openxmlformats.org/officeDocument/2006/relationships" xmlns:p="http://schemas.openxmlformats.org/presentationml/2006/main">
+  <p:cSld>
+    <p:spTree>
+      <p:nvGrpSpPr>
+        <p:cNvPr id="1" name=""/>
+        <p:cNvGrpSpPr/>
+        <p:nvPr/>
+      </p:nvGrpSpPr>
+      <p:grpSpPr>
+        <a:xfrm>
+          <a:off x="0" y="0"/>
+          <a:ext cx="0" cy="0"/>
+          <a:chOff x="0" y="0"/>
+          <a:chExt cx="0" cy="0"/>
+        </a:xfrm>
+      </p:grpSpPr>
+      <p:sp>
+        <p:nvSpPr>
+          <p:cNvPr id="2" name="Title 1"/>
+          <p:cNvSpPr>
+            <a:spLocks noGrp="1"/>
+          </p:cNvSpPr>
+          <p:nvPr>
+            <p:ph type="title"/>
+          </p:nvPr>
+        </p:nvSpPr>
+        <p:spPr/>
+        <p:txBody>
+          <a:bodyPr>
+            <a:normAutofit/>
+          </a:bodyPr>
+          <a:lstStyle/>
+          <a:p>
+            <a:r>
+              <a:rPr lang="en-IE" b="1" dirty="0" smtClean="0">
+                <a:solidFill>
+                  <a:schemeClr val="tx2"/>
+                </a:solidFill>
+              </a:rPr>
+              <a:t>Tree</a:t>
+            </a:r>
+            <a:endParaRPr lang="en-IE" b="1" dirty="0">
+              <a:solidFill>
+                <a:schemeClr val="tx2"/>
+              </a:solidFill>
+            </a:endParaRPr>
+          </a:p>
+        </p:txBody>
+      </p:sp>
+      <p:sp>
+        <p:nvSpPr>
+          <p:cNvPr id="3" name="Content Placeholder 2"/>
+          <p:cNvSpPr>
+            <a:spLocks noGrp="1"/>
+          </p:cNvSpPr>
+          <p:nvPr>
+            <p:ph idx="1"/>
+          </p:nvPr>
+        </p:nvSpPr>
+        <p:spPr>
+          <a:xfrm>
+            <a:off x="838200" y="1825625"/>
+            <a:ext cx="10515600" cy="4846108"/>
+          </a:xfrm>
+        </p:spPr>
+        <p:txBody>
+          <a:bodyPr>
+            <a:normAutofit/>
+          </a:bodyPr>
+          <a:lstStyle/>
+          <a:p>
+            <a:r>
+              <a:rPr lang="en-IE" dirty="0" smtClean="0">
+                <a:solidFill>
+                  <a:schemeClr val="tx2"/>
+                </a:solidFill>
+              </a:rPr>
+              <a:t>Directories</a:t>
+            </a:r>
+          </a:p>
+          <a:p>
+            <a:r>
+              <a:rPr lang="en-IE" dirty="0" smtClean="0">
+                <a:solidFill>
+                  <a:schemeClr val="tx2"/>
+                </a:solidFill>
+              </a:rPr>
+              <a:t>List </a:t>
+            </a:r>
+            <a:r>
+              <a:rPr lang="en-IE" dirty="0">
+                <a:solidFill>
+                  <a:schemeClr val="tx2"/>
+                </a:solidFill>
+              </a:rPr>
+              <a:t>of trees and blobs that the tree contains, along with the names and modes of those trees and blobs</a:t>
+            </a:r>
+            <a:endParaRPr lang="en-IE" dirty="0" smtClean="0">
+              <a:solidFill>
+                <a:schemeClr val="tx2"/>
+              </a:solidFill>
+            </a:endParaRPr>
+          </a:p>
+          <a:p>
+            <a:pPr marL="0" indent="0">
+              <a:buNone/>
+            </a:pPr>
+            <a:endParaRPr lang="en-IE" dirty="0"/>
+          </a:p>
+        </p:txBody>
+      </p:sp>
+      <p:pic>
+        <p:nvPicPr>
+          <p:cNvPr id="4" name="Picture 3"/>
+          <p:cNvPicPr>
+            <a:picLocks noChangeAspect="1"/>
+          </p:cNvPicPr>
+          <p:nvPr/>
+        </p:nvPicPr>
+        <p:blipFill>
+          <a:blip r:embed="rId2">
+            <a:extLst>
+              <a:ext uri="{28A0092B-C50C-407E-A947-70E740481C1C}">
+                <a14:useLocalDpi xmlns:a14="http://schemas.microsoft.com/office/drawing/2010/main" val="0"/>
+              </a:ext>
+            </a:extLst>
+          </a:blip>
+          <a:stretch>
+            <a:fillRect/>
+          </a:stretch>
+        </p:blipFill>
+        <p:spPr>
+          <a:xfrm>
+            <a:off x="9433135" y="169334"/>
+            <a:ext cx="2519681" cy="1049867"/>
+          </a:xfrm>
+          <a:prstGeom prst="rect">
+            <a:avLst/>
+          </a:prstGeom>
+        </p:spPr>
+      </p:pic>
+      <p:pic>
+        <p:nvPicPr>
+          <p:cNvPr id="6" name="Picture 5"/>
+          <p:cNvPicPr>
+            <a:picLocks noChangeAspect="1"/>
+          </p:cNvPicPr>
+          <p:nvPr/>
+        </p:nvPicPr>
+        <p:blipFill>
+          <a:blip r:embed="rId3"/>
+          <a:stretch>
+            <a:fillRect/>
+          </a:stretch>
+        </p:blipFill>
+        <p:spPr>
+          <a:xfrm>
+            <a:off x="2523068" y="3571346"/>
+            <a:ext cx="6496128" cy="2740554"/>
+          </a:xfrm>
+          <a:prstGeom prst="rect">
+            <a:avLst/>
+          </a:prstGeom>
+        </p:spPr>
+      </p:pic>
+    </p:spTree>
+    <p:extLst>
+      <p:ext uri="{BB962C8B-B14F-4D97-AF65-F5344CB8AC3E}">
+        <p14:creationId xmlns:p14="http://schemas.microsoft.com/office/powerpoint/2010/main" val="1042534553"/>
+      </p:ext>
+    </p:extLst>
+  </p:cSld>
+  <p:clrMapOvr>
+    <a:masterClrMapping/>
+  </p:clrMapOvr>
+  <p:timing>
+    <p:tnLst>
+      <p:par>
+        <p:cTn id="1" dur="indefinite" restart="never" nodeType="tmRoot"/>
+      </p:par>
+    </p:tnLst>
+  </p:timing>
+</p:sld>
+</file>
+
+<file path=ppt/slides/slide24.xml><?xml version="1.0" encoding="utf-8"?>
+<p:sld xmlns:a="http://schemas.openxmlformats.org/drawingml/2006/main" xmlns:r="http://schemas.openxmlformats.org/officeDocument/2006/relationships" xmlns:p="http://schemas.openxmlformats.org/presentationml/2006/main">
+  <p:cSld>
+    <p:spTree>
+      <p:nvGrpSpPr>
+        <p:cNvPr id="1" name=""/>
+        <p:cNvGrpSpPr/>
+        <p:nvPr/>
+      </p:nvGrpSpPr>
+      <p:grpSpPr>
+        <a:xfrm>
+          <a:off x="0" y="0"/>
+          <a:ext cx="0" cy="0"/>
+          <a:chOff x="0" y="0"/>
+          <a:chExt cx="0" cy="0"/>
+        </a:xfrm>
+      </p:grpSpPr>
+      <p:sp>
+        <p:nvSpPr>
+          <p:cNvPr id="2" name="Title 1"/>
+          <p:cNvSpPr>
+            <a:spLocks noGrp="1"/>
+          </p:cNvSpPr>
+          <p:nvPr>
+            <p:ph type="title"/>
+          </p:nvPr>
+        </p:nvSpPr>
+        <p:spPr/>
+        <p:txBody>
+          <a:bodyPr>
+            <a:normAutofit/>
+          </a:bodyPr>
+          <a:lstStyle/>
+          <a:p>
+            <a:r>
+              <a:rPr lang="en-IE" b="1" dirty="0" smtClean="0">
+                <a:solidFill>
+                  <a:schemeClr val="tx2"/>
+                </a:solidFill>
+              </a:rPr>
+              <a:t>Commit</a:t>
+            </a:r>
+            <a:endParaRPr lang="en-IE" b="1" dirty="0">
+              <a:solidFill>
+                <a:schemeClr val="tx2"/>
+              </a:solidFill>
+            </a:endParaRPr>
+          </a:p>
+        </p:txBody>
+      </p:sp>
+      <p:sp>
+        <p:nvSpPr>
+          <p:cNvPr id="3" name="Content Placeholder 2"/>
+          <p:cNvSpPr>
+            <a:spLocks noGrp="1"/>
+          </p:cNvSpPr>
+          <p:nvPr>
+            <p:ph idx="1"/>
+          </p:nvPr>
+        </p:nvSpPr>
+        <p:spPr/>
+        <p:txBody>
+          <a:bodyPr>
+            <a:normAutofit/>
+          </a:bodyPr>
+          <a:lstStyle/>
+          <a:p>
+            <a:r>
+              <a:rPr lang="en-IE" dirty="0" smtClean="0">
+                <a:solidFill>
+                  <a:schemeClr val="tx2"/>
+                </a:solidFill>
+              </a:rPr>
+              <a:t>Points </a:t>
+            </a:r>
+            <a:r>
+              <a:rPr lang="en-IE" dirty="0">
+                <a:solidFill>
+                  <a:schemeClr val="tx2"/>
+                </a:solidFill>
+              </a:rPr>
+              <a:t>to a tree and keeps an author, committer, message and any parent commits that directly preceded it</a:t>
+            </a:r>
+            <a:endParaRPr lang="en-IE" dirty="0" smtClean="0">
+              <a:solidFill>
+                <a:schemeClr val="tx2"/>
+              </a:solidFill>
+            </a:endParaRPr>
+          </a:p>
+          <a:p>
+            <a:pPr marL="0" indent="0">
+              <a:buNone/>
+            </a:pPr>
+            <a:endParaRPr lang="en-IE" dirty="0"/>
+          </a:p>
+        </p:txBody>
+      </p:sp>
+      <p:pic>
+        <p:nvPicPr>
+          <p:cNvPr id="4" name="Picture 3"/>
+          <p:cNvPicPr>
+            <a:picLocks noChangeAspect="1"/>
+          </p:cNvPicPr>
+          <p:nvPr/>
+        </p:nvPicPr>
+        <p:blipFill>
+          <a:blip r:embed="rId2">
+            <a:extLst>
+              <a:ext uri="{28A0092B-C50C-407E-A947-70E740481C1C}">
+                <a14:useLocalDpi xmlns:a14="http://schemas.microsoft.com/office/drawing/2010/main" val="0"/>
+              </a:ext>
+            </a:extLst>
+          </a:blip>
+          <a:stretch>
+            <a:fillRect/>
+          </a:stretch>
+        </p:blipFill>
+        <p:spPr>
+          <a:xfrm>
+            <a:off x="9433135" y="169334"/>
+            <a:ext cx="2519681" cy="1049867"/>
+          </a:xfrm>
+          <a:prstGeom prst="rect">
+            <a:avLst/>
+          </a:prstGeom>
+        </p:spPr>
+      </p:pic>
+      <p:pic>
+        <p:nvPicPr>
+          <p:cNvPr id="5" name="Picture 4"/>
+          <p:cNvPicPr>
+            <a:picLocks noChangeAspect="1"/>
+          </p:cNvPicPr>
+          <p:nvPr/>
+        </p:nvPicPr>
+        <p:blipFill>
+          <a:blip r:embed="rId3"/>
+          <a:stretch>
+            <a:fillRect/>
+          </a:stretch>
+        </p:blipFill>
+        <p:spPr>
+          <a:xfrm>
+            <a:off x="1614487" y="2859087"/>
+            <a:ext cx="7461780" cy="3603624"/>
+          </a:xfrm>
+          <a:prstGeom prst="rect">
+            <a:avLst/>
+          </a:prstGeom>
+        </p:spPr>
+      </p:pic>
+    </p:spTree>
+    <p:extLst>
+      <p:ext uri="{BB962C8B-B14F-4D97-AF65-F5344CB8AC3E}">
+        <p14:creationId xmlns:p14="http://schemas.microsoft.com/office/powerpoint/2010/main" val="186135228"/>
+      </p:ext>
+    </p:extLst>
+  </p:cSld>
+  <p:clrMapOvr>
+    <a:masterClrMapping/>
+  </p:clrMapOvr>
+  <p:timing>
+    <p:tnLst>
+      <p:par>
+        <p:cTn id="1" dur="indefinite" restart="never" nodeType="tmRoot"/>
+      </p:par>
+    </p:tnLst>
+  </p:timing>
+</p:sld>
+</file>
+
+<file path=ppt/slides/slide25.xml><?xml version="1.0" encoding="utf-8"?>
+<p:sld xmlns:a="http://schemas.openxmlformats.org/drawingml/2006/main" xmlns:r="http://schemas.openxmlformats.org/officeDocument/2006/relationships" xmlns:p="http://schemas.openxmlformats.org/presentationml/2006/main">
+  <p:cSld>
+    <p:spTree>
+      <p:nvGrpSpPr>
+        <p:cNvPr id="1" name=""/>
+        <p:cNvGrpSpPr/>
+        <p:nvPr/>
+      </p:nvGrpSpPr>
+      <p:grpSpPr>
+        <a:xfrm>
+          <a:off x="0" y="0"/>
+          <a:ext cx="0" cy="0"/>
+          <a:chOff x="0" y="0"/>
+          <a:chExt cx="0" cy="0"/>
+        </a:xfrm>
+      </p:grpSpPr>
+      <p:sp>
+        <p:nvSpPr>
+          <p:cNvPr id="2" name="Title 1"/>
+          <p:cNvSpPr>
+            <a:spLocks noGrp="1"/>
+          </p:cNvSpPr>
+          <p:nvPr>
+            <p:ph type="title"/>
+          </p:nvPr>
+        </p:nvSpPr>
+        <p:spPr/>
+        <p:txBody>
+          <a:bodyPr>
+            <a:normAutofit/>
+          </a:bodyPr>
+          <a:lstStyle/>
+          <a:p>
+            <a:r>
+              <a:rPr lang="en-IE" b="1" dirty="0" smtClean="0">
+                <a:solidFill>
+                  <a:schemeClr val="tx2"/>
+                </a:solidFill>
+              </a:rPr>
+              <a:t>Tag</a:t>
+            </a:r>
+            <a:endParaRPr lang="en-IE" b="1" dirty="0">
+              <a:solidFill>
+                <a:schemeClr val="tx2"/>
+              </a:solidFill>
+            </a:endParaRPr>
+          </a:p>
+        </p:txBody>
+      </p:sp>
+      <p:sp>
+        <p:nvSpPr>
+          <p:cNvPr id="3" name="Content Placeholder 2"/>
+          <p:cNvSpPr>
+            <a:spLocks noGrp="1"/>
+          </p:cNvSpPr>
+          <p:nvPr>
+            <p:ph idx="1"/>
+          </p:nvPr>
+        </p:nvSpPr>
+        <p:spPr/>
+        <p:txBody>
+          <a:bodyPr>
+            <a:normAutofit/>
+          </a:bodyPr>
+          <a:lstStyle/>
+          <a:p>
+            <a:r>
+              <a:rPr lang="en-IE" dirty="0" smtClean="0">
+                <a:solidFill>
+                  <a:schemeClr val="tx2"/>
+                </a:solidFill>
+              </a:rPr>
+              <a:t>Permanent </a:t>
+            </a:r>
+            <a:r>
+              <a:rPr lang="en-IE" dirty="0">
+                <a:solidFill>
+                  <a:schemeClr val="tx2"/>
+                </a:solidFill>
+              </a:rPr>
+              <a:t>shorthand name for a particular commit</a:t>
+            </a:r>
+            <a:endParaRPr lang="en-IE" dirty="0"/>
+          </a:p>
+        </p:txBody>
+      </p:sp>
+      <p:pic>
+        <p:nvPicPr>
+          <p:cNvPr id="4" name="Picture 3"/>
+          <p:cNvPicPr>
+            <a:picLocks noChangeAspect="1"/>
+          </p:cNvPicPr>
+          <p:nvPr/>
+        </p:nvPicPr>
+        <p:blipFill>
+          <a:blip r:embed="rId2">
+            <a:extLst>
+              <a:ext uri="{28A0092B-C50C-407E-A947-70E740481C1C}">
+                <a14:useLocalDpi xmlns:a14="http://schemas.microsoft.com/office/drawing/2010/main" val="0"/>
+              </a:ext>
+            </a:extLst>
+          </a:blip>
+          <a:stretch>
+            <a:fillRect/>
+          </a:stretch>
+        </p:blipFill>
+        <p:spPr>
+          <a:xfrm>
+            <a:off x="9433135" y="169334"/>
+            <a:ext cx="2519681" cy="1049867"/>
+          </a:xfrm>
+          <a:prstGeom prst="rect">
+            <a:avLst/>
+          </a:prstGeom>
+        </p:spPr>
+      </p:pic>
+      <p:pic>
+        <p:nvPicPr>
+          <p:cNvPr id="6" name="Picture 5"/>
+          <p:cNvPicPr>
+            <a:picLocks noChangeAspect="1"/>
+          </p:cNvPicPr>
+          <p:nvPr/>
+        </p:nvPicPr>
+        <p:blipFill>
+          <a:blip r:embed="rId3"/>
+          <a:stretch>
+            <a:fillRect/>
+          </a:stretch>
+        </p:blipFill>
+        <p:spPr>
+          <a:xfrm>
+            <a:off x="3476728" y="2418292"/>
+            <a:ext cx="3451360" cy="3576108"/>
+          </a:xfrm>
+          <a:prstGeom prst="rect">
+            <a:avLst/>
+          </a:prstGeom>
+        </p:spPr>
+      </p:pic>
+    </p:spTree>
+    <p:extLst>
+      <p:ext uri="{BB962C8B-B14F-4D97-AF65-F5344CB8AC3E}">
+        <p14:creationId xmlns:p14="http://schemas.microsoft.com/office/powerpoint/2010/main" val="4228325872"/>
+      </p:ext>
+    </p:extLst>
+  </p:cSld>
+  <p:clrMapOvr>
+    <a:masterClrMapping/>
+  </p:clrMapOvr>
+  <p:timing>
+    <p:tnLst>
+      <p:par>
+        <p:cTn id="1" dur="indefinite" restart="never" nodeType="tmRoot"/>
+      </p:par>
+    </p:tnLst>
+  </p:timing>
+</p:sld>
+</file>
+
+<file path=ppt/slides/slide26.xml><?xml version="1.0" encoding="utf-8"?>
+<p:sld xmlns:a="http://schemas.openxmlformats.org/drawingml/2006/main" xmlns:r="http://schemas.openxmlformats.org/officeDocument/2006/relationships" xmlns:p="http://schemas.openxmlformats.org/presentationml/2006/main">
+  <p:cSld>
+    <p:spTree>
+      <p:nvGrpSpPr>
+        <p:cNvPr id="1" name=""/>
+        <p:cNvGrpSpPr/>
+        <p:nvPr/>
+      </p:nvGrpSpPr>
+      <p:grpSpPr>
+        <a:xfrm>
+          <a:off x="0" y="0"/>
+          <a:ext cx="0" cy="0"/>
+          <a:chOff x="0" y="0"/>
+          <a:chExt cx="0" cy="0"/>
+        </a:xfrm>
+      </p:grpSpPr>
+      <p:sp>
+        <p:nvSpPr>
+          <p:cNvPr id="2" name="Title 1"/>
+          <p:cNvSpPr>
+            <a:spLocks noGrp="1"/>
+          </p:cNvSpPr>
+          <p:nvPr>
+            <p:ph type="title"/>
+          </p:nvPr>
+        </p:nvSpPr>
+        <p:spPr/>
+        <p:txBody>
+          <a:bodyPr>
+            <a:normAutofit/>
+          </a:bodyPr>
+          <a:lstStyle/>
+          <a:p>
+            <a:r>
+              <a:rPr lang="en-IE" b="1" dirty="0" smtClean="0">
+                <a:solidFill>
+                  <a:schemeClr val="tx2"/>
+                </a:solidFill>
+              </a:rPr>
               <a:t>Resources</a:t>
             </a:r>
             <a:endParaRPr lang="en-IE" b="1" dirty="0">
@@ -6643,11 +8846,6 @@
               </a:rPr>
               <a:t>Pro Git </a:t>
             </a:r>
-          </a:p>
-          <a:p>
-            <a:pPr marL="0" indent="0">
-              <a:buNone/>
-            </a:pPr>
             <a:r>
               <a:rPr lang="en-IE" dirty="0" smtClean="0">
                 <a:solidFill>
@@ -6698,11 +8896,6 @@
               </a:rPr>
               <a:t>IMMERSION </a:t>
             </a:r>
-          </a:p>
-          <a:p>
-            <a:pPr marL="0" indent="0">
-              <a:buNone/>
-            </a:pPr>
             <a:r>
               <a:rPr lang="en-IE" dirty="0" smtClean="0">
                 <a:solidFill>
@@ -6745,6 +8938,59 @@
               </a:rPr>
               <a:t>git ready </a:t>
             </a:r>
+            <a:r>
+              <a:rPr lang="en-IE" dirty="0" smtClean="0">
+                <a:hlinkClick r:id="rId4"/>
+              </a:rPr>
+              <a:t>http</a:t>
+            </a:r>
+            <a:r>
+              <a:rPr lang="en-IE" dirty="0">
+                <a:hlinkClick r:id="rId4"/>
+              </a:rPr>
+              <a:t>://</a:t>
+            </a:r>
+            <a:r>
+              <a:rPr lang="en-IE" dirty="0" smtClean="0">
+                <a:hlinkClick r:id="rId4"/>
+              </a:rPr>
+              <a:t>gitready.com</a:t>
+            </a:r>
+            <a:endParaRPr lang="en-IE" dirty="0" smtClean="0"/>
+          </a:p>
+          <a:p>
+            <a:r>
+              <a:rPr lang="en-IE" dirty="0" smtClean="0">
+                <a:solidFill>
+                  <a:schemeClr val="tx2"/>
+                </a:solidFill>
+              </a:rPr>
+              <a:t>Introduction </a:t>
+            </a:r>
+            <a:r>
+              <a:rPr lang="en-IE" dirty="0">
+                <a:solidFill>
+                  <a:schemeClr val="tx2"/>
+                </a:solidFill>
+              </a:rPr>
+              <a:t>to Git with Scott Chacon of </a:t>
+            </a:r>
+            <a:r>
+              <a:rPr lang="en-IE" dirty="0" err="1" smtClean="0">
+                <a:solidFill>
+                  <a:schemeClr val="tx2"/>
+                </a:solidFill>
+              </a:rPr>
+              <a:t>GitHub</a:t>
+            </a:r>
+            <a:r>
+              <a:rPr lang="en-IE" dirty="0" err="1" smtClean="0">
+                <a:solidFill>
+                  <a:schemeClr val="tx2"/>
+                </a:solidFill>
+              </a:rPr>
+              <a:t>Search</a:t>
+            </a:r>
             <a:endParaRPr lang="en-IE" dirty="0" smtClean="0">
               <a:solidFill>
                 <a:schemeClr val="tx2"/>
@@ -6752,80 +8998,66 @@
             </a:endParaRPr>
           </a:p>
           <a:p>
+            <a:r>
+              <a:rPr lang="en-IE" dirty="0" smtClean="0">
+                <a:solidFill>
+                  <a:schemeClr val="tx2"/>
+                </a:solidFill>
+              </a:rPr>
+              <a:t>Git Internals </a:t>
+            </a:r>
+            <a:r>
+              <a:rPr lang="en-IE" dirty="0" smtClean="0">
+                <a:solidFill>
+                  <a:schemeClr val="tx2"/>
+                </a:solidFill>
+                <a:hlinkClick r:id="rId5"/>
+              </a:rPr>
+              <a:t>https</a:t>
+            </a:r>
+            <a:r>
+              <a:rPr lang="en-IE" dirty="0">
+                <a:solidFill>
+                  <a:schemeClr val="tx2"/>
+                </a:solidFill>
+                <a:hlinkClick r:id="rId5"/>
+              </a:rPr>
+              <a:t>://</a:t>
+            </a:r>
+            <a:r>
+              <a:rPr lang="en-IE" dirty="0" smtClean="0">
+                <a:solidFill>
+                  <a:schemeClr val="tx2"/>
+                </a:solidFill>
+                <a:hlinkClick r:id="rId5"/>
+              </a:rPr>
+              <a:t>github.com/pluralsight/git-internals-pdf</a:t>
+            </a:r>
+            <a:endParaRPr lang="en-IE" dirty="0" smtClean="0">
+              <a:solidFill>
+                <a:schemeClr val="tx2"/>
+              </a:solidFill>
+            </a:endParaRPr>
+          </a:p>
+          <a:p>
+            <a:r>
+              <a:rPr lang="en-IE" dirty="0" smtClean="0">
+                <a:solidFill>
+                  <a:schemeClr val="tx2"/>
+                </a:solidFill>
+              </a:rPr>
+              <a:t>Search</a:t>
+            </a:r>
+          </a:p>
+          <a:p>
             <a:pPr marL="0" indent="0">
               <a:buNone/>
             </a:pPr>
-            <a:r>
-              <a:rPr lang="en-IE" dirty="0" smtClean="0">
-                <a:hlinkClick r:id="rId4"/>
-              </a:rPr>
-              <a:t>http</a:t>
-            </a:r>
-            <a:r>
-              <a:rPr lang="en-IE" dirty="0">
-                <a:hlinkClick r:id="rId4"/>
-              </a:rPr>
-              <a:t>://</a:t>
-            </a:r>
-            <a:r>
-              <a:rPr lang="en-IE" dirty="0" smtClean="0">
-                <a:hlinkClick r:id="rId4"/>
-              </a:rPr>
-              <a:t>gitready.com</a:t>
-            </a:r>
-            <a:endParaRPr lang="en-IE" dirty="0" smtClean="0"/>
-          </a:p>
-          <a:p>
-            <a:r>
-              <a:rPr lang="en-IE" dirty="0">
-                <a:solidFill>
-                  <a:schemeClr val="tx2"/>
-                </a:solidFill>
-              </a:rPr>
-              <a:t>Linus Torvalds on </a:t>
-            </a:r>
-            <a:r>
-              <a:rPr lang="en-IE" dirty="0" smtClean="0">
-                <a:solidFill>
-                  <a:schemeClr val="tx2"/>
-                </a:solidFill>
-              </a:rPr>
-              <a:t>git</a:t>
-            </a:r>
-          </a:p>
-          <a:p>
-            <a:pPr marL="0" indent="0">
-              <a:buNone/>
-            </a:pPr>
-            <a:r>
-              <a:rPr lang="en-IE" dirty="0" smtClean="0">
-                <a:hlinkClick r:id="rId5"/>
-              </a:rPr>
-              <a:t>https</a:t>
-            </a:r>
-            <a:r>
-              <a:rPr lang="en-IE" dirty="0">
-                <a:hlinkClick r:id="rId5"/>
-              </a:rPr>
-              <a:t>://</a:t>
-            </a:r>
-            <a:r>
-              <a:rPr lang="en-IE" dirty="0" smtClean="0">
-                <a:hlinkClick r:id="rId5"/>
-              </a:rPr>
-              <a:t>www.youtube.com/watch?v=4XpnKHJAok8</a:t>
-            </a:r>
-            <a:endParaRPr lang="en-IE" dirty="0" smtClean="0"/>
-          </a:p>
-          <a:p>
-            <a:r>
-              <a:rPr lang="en-IE" dirty="0" smtClean="0">
-                <a:solidFill>
-                  <a:schemeClr val="tx2"/>
-                </a:solidFill>
-              </a:rPr>
-              <a:t>Search</a:t>
-            </a:r>
+            <a:endParaRPr lang="en-IE" dirty="0" smtClean="0">
+              <a:solidFill>
+                <a:schemeClr val="tx2"/>
+              </a:solidFill>
+            </a:endParaRPr>
           </a:p>
           <a:p>
             <a:endParaRPr lang="en-IE" dirty="0"/>
@@ -6869,434 +9101,6 @@
     <p:extLst>
       <p:ext uri="{BB962C8B-B14F-4D97-AF65-F5344CB8AC3E}">
         <p14:creationId xmlns:p14="http://schemas.microsoft.com/office/powerpoint/2010/main" val="923575725"/>
-      </p:ext>
-    </p:extLst>
-  </p:cSld>
-  <p:clrMapOvr>
-    <a:masterClrMapping/>
-  </p:clrMapOvr>
-  <p:timing>
-    <p:tnLst>
-      <p:par>
-        <p:cTn id="1" dur="indefinite" restart="never" nodeType="tmRoot"/>
-      </p:par>
-    </p:tnLst>
-  </p:timing>
-</p:sld>
-</file>
-
-<file path=ppt/slides/slide2.xml><?xml version="1.0" encoding="utf-8"?>
-<p:sld xmlns:a="http://schemas.openxmlformats.org/drawingml/2006/main" xmlns:r="http://schemas.openxmlformats.org/officeDocument/2006/relationships" xmlns:p="http://schemas.openxmlformats.org/presentationml/2006/main">
-  <p:cSld>
-    <p:spTree>
-      <p:nvGrpSpPr>
-        <p:cNvPr id="1" name=""/>
-        <p:cNvGrpSpPr/>
-        <p:nvPr/>
-      </p:nvGrpSpPr>
-      <p:grpSpPr>
-        <a:xfrm>
-          <a:off x="0" y="0"/>
-          <a:ext cx="0" cy="0"/>
-          <a:chOff x="0" y="0"/>
-          <a:chExt cx="0" cy="0"/>
-        </a:xfrm>
-      </p:grpSpPr>
-      <p:sp>
-        <p:nvSpPr>
-          <p:cNvPr id="2" name="Title 1"/>
-          <p:cNvSpPr>
-            <a:spLocks noGrp="1"/>
-          </p:cNvSpPr>
-          <p:nvPr>
-            <p:ph type="title"/>
-          </p:nvPr>
-        </p:nvSpPr>
-        <p:spPr/>
-        <p:txBody>
-          <a:bodyPr/>
-          <a:lstStyle/>
-          <a:p>
-            <a:r>
-              <a:rPr lang="en-IE" b="1" dirty="0">
-                <a:solidFill>
-                  <a:schemeClr val="tx2"/>
-                </a:solidFill>
-              </a:rPr>
-              <a:t>Agenda</a:t>
-            </a:r>
-            <a:endParaRPr lang="en-IE" b="1" dirty="0">
-              <a:solidFill>
-                <a:schemeClr val="tx2"/>
-              </a:solidFill>
-            </a:endParaRPr>
-          </a:p>
-        </p:txBody>
-      </p:sp>
-      <p:sp>
-        <p:nvSpPr>
-          <p:cNvPr id="3" name="Text Placeholder 2"/>
-          <p:cNvSpPr>
-            <a:spLocks noGrp="1"/>
-          </p:cNvSpPr>
-          <p:nvPr>
-            <p:ph type="body" idx="1"/>
-          </p:nvPr>
-        </p:nvSpPr>
-        <p:spPr>
-          <a:xfrm>
-            <a:off x="839788" y="1350238"/>
-            <a:ext cx="5157787" cy="823912"/>
-          </a:xfrm>
-        </p:spPr>
-        <p:txBody>
-          <a:bodyPr/>
-          <a:lstStyle/>
-          <a:p>
-            <a:r>
-              <a:rPr lang="en-IE" dirty="0" smtClean="0">
-                <a:solidFill>
-                  <a:schemeClr val="tx2"/>
-                </a:solidFill>
-              </a:rPr>
-              <a:t>Day 1</a:t>
-            </a:r>
-            <a:endParaRPr lang="en-IE" dirty="0">
-              <a:solidFill>
-                <a:schemeClr val="tx2"/>
-              </a:solidFill>
-            </a:endParaRPr>
-          </a:p>
-        </p:txBody>
-      </p:sp>
-      <p:sp>
-        <p:nvSpPr>
-          <p:cNvPr id="4" name="Content Placeholder 3"/>
-          <p:cNvSpPr>
-            <a:spLocks noGrp="1"/>
-          </p:cNvSpPr>
-          <p:nvPr>
-            <p:ph sz="half" idx="2"/>
-          </p:nvPr>
-        </p:nvSpPr>
-        <p:spPr/>
-        <p:txBody>
-          <a:bodyPr/>
-          <a:lstStyle/>
-          <a:p>
-            <a:r>
-              <a:rPr lang="en-IE" dirty="0">
-                <a:solidFill>
-                  <a:schemeClr val="tx2"/>
-                </a:solidFill>
-              </a:rPr>
-              <a:t>Getting to know Git</a:t>
-            </a:r>
-          </a:p>
-          <a:p>
-            <a:r>
-              <a:rPr lang="en-IE" dirty="0">
-                <a:solidFill>
-                  <a:schemeClr val="tx2"/>
-                </a:solidFill>
-              </a:rPr>
-              <a:t>Working with Git locally</a:t>
-            </a:r>
-          </a:p>
-          <a:p>
-            <a:r>
-              <a:rPr lang="en-IE" dirty="0" smtClean="0">
-                <a:solidFill>
-                  <a:schemeClr val="tx2"/>
-                </a:solidFill>
-              </a:rPr>
-              <a:t>Git integration</a:t>
-            </a:r>
-          </a:p>
-          <a:p>
-            <a:pPr lvl="1"/>
-            <a:r>
-              <a:rPr lang="en-IE" dirty="0" smtClean="0">
-                <a:solidFill>
-                  <a:schemeClr val="tx2"/>
-                </a:solidFill>
-              </a:rPr>
-              <a:t>Git </a:t>
-            </a:r>
-            <a:r>
-              <a:rPr lang="en-IE" dirty="0" err="1" smtClean="0">
-                <a:solidFill>
-                  <a:schemeClr val="tx2"/>
-                </a:solidFill>
-              </a:rPr>
-              <a:t>Gui</a:t>
-            </a:r>
-            <a:endParaRPr lang="en-IE" dirty="0" smtClean="0">
-              <a:solidFill>
-                <a:schemeClr val="tx2"/>
-              </a:solidFill>
-            </a:endParaRPr>
-          </a:p>
-          <a:p>
-            <a:pPr lvl="1"/>
-            <a:r>
-              <a:rPr lang="en-IE" dirty="0">
-                <a:solidFill>
-                  <a:schemeClr val="tx2"/>
-                </a:solidFill>
-              </a:rPr>
-              <a:t>Visual Studio Tools for </a:t>
-            </a:r>
-            <a:r>
-              <a:rPr lang="en-IE" dirty="0" smtClean="0">
-                <a:solidFill>
-                  <a:schemeClr val="tx2"/>
-                </a:solidFill>
-              </a:rPr>
-              <a:t>Git</a:t>
-            </a:r>
-          </a:p>
-          <a:p>
-            <a:r>
-              <a:rPr lang="en-IE" dirty="0" smtClean="0">
-                <a:solidFill>
-                  <a:schemeClr val="tx2"/>
-                </a:solidFill>
-              </a:rPr>
-              <a:t>Git and TFS</a:t>
-            </a:r>
-          </a:p>
-          <a:p>
-            <a:r>
-              <a:rPr lang="en-IE" dirty="0" smtClean="0">
-                <a:solidFill>
-                  <a:schemeClr val="tx2"/>
-                </a:solidFill>
-              </a:rPr>
-              <a:t>Git and Multimedia</a:t>
-            </a:r>
-            <a:endParaRPr lang="en-IE" dirty="0">
-              <a:solidFill>
-                <a:schemeClr val="tx2"/>
-              </a:solidFill>
-            </a:endParaRPr>
-          </a:p>
-          <a:p>
-            <a:pPr lvl="1"/>
-            <a:endParaRPr lang="en-IE" dirty="0">
-              <a:solidFill>
-                <a:schemeClr val="tx2"/>
-              </a:solidFill>
-            </a:endParaRPr>
-          </a:p>
-          <a:p>
-            <a:pPr marL="0" indent="0">
-              <a:buNone/>
-            </a:pPr>
-            <a:endParaRPr lang="en-IE" dirty="0">
-              <a:solidFill>
-                <a:schemeClr val="tx2"/>
-              </a:solidFill>
-            </a:endParaRPr>
-          </a:p>
-        </p:txBody>
-      </p:sp>
-      <p:sp>
-        <p:nvSpPr>
-          <p:cNvPr id="5" name="Text Placeholder 4"/>
-          <p:cNvSpPr>
-            <a:spLocks noGrp="1"/>
-          </p:cNvSpPr>
-          <p:nvPr>
-            <p:ph type="body" sz="quarter" idx="3"/>
-          </p:nvPr>
-        </p:nvSpPr>
-        <p:spPr>
-          <a:xfrm>
-            <a:off x="6172200" y="1350238"/>
-            <a:ext cx="5183188" cy="823912"/>
-          </a:xfrm>
-        </p:spPr>
-        <p:txBody>
-          <a:bodyPr/>
-          <a:lstStyle/>
-          <a:p>
-            <a:r>
-              <a:rPr lang="en-IE" dirty="0" smtClean="0">
-                <a:solidFill>
-                  <a:schemeClr val="tx2"/>
-                </a:solidFill>
-              </a:rPr>
-              <a:t>Day 2</a:t>
-            </a:r>
-            <a:endParaRPr lang="en-IE" dirty="0">
-              <a:solidFill>
-                <a:schemeClr val="tx2"/>
-              </a:solidFill>
-            </a:endParaRPr>
-          </a:p>
-        </p:txBody>
-      </p:sp>
-      <p:sp>
-        <p:nvSpPr>
-          <p:cNvPr id="6" name="Content Placeholder 5"/>
-          <p:cNvSpPr>
-            <a:spLocks noGrp="1"/>
-          </p:cNvSpPr>
-          <p:nvPr>
-            <p:ph sz="quarter" idx="4"/>
-          </p:nvPr>
-        </p:nvSpPr>
-        <p:spPr/>
-        <p:txBody>
-          <a:bodyPr>
-            <a:normAutofit/>
-          </a:bodyPr>
-          <a:lstStyle/>
-          <a:p>
-            <a:r>
-              <a:rPr lang="en-IE" dirty="0" smtClean="0">
-                <a:solidFill>
-                  <a:schemeClr val="tx2"/>
-                </a:solidFill>
-              </a:rPr>
-              <a:t>Recap</a:t>
-            </a:r>
-            <a:endParaRPr lang="en-IE" dirty="0">
-              <a:solidFill>
-                <a:schemeClr val="tx2"/>
-              </a:solidFill>
-            </a:endParaRPr>
-          </a:p>
-          <a:p>
-            <a:r>
-              <a:rPr lang="en-IE" dirty="0">
-                <a:solidFill>
-                  <a:schemeClr val="tx2"/>
-                </a:solidFill>
-              </a:rPr>
-              <a:t>Working with Git </a:t>
-            </a:r>
-            <a:r>
-              <a:rPr lang="en-IE" dirty="0" smtClean="0">
-                <a:solidFill>
-                  <a:schemeClr val="tx2"/>
-                </a:solidFill>
-              </a:rPr>
-              <a:t>remotely</a:t>
-            </a:r>
-          </a:p>
-          <a:p>
-            <a:r>
-              <a:rPr lang="en-IE" dirty="0" err="1" smtClean="0">
-                <a:solidFill>
-                  <a:schemeClr val="tx2"/>
-                </a:solidFill>
-              </a:rPr>
-              <a:t>GitHub</a:t>
-            </a:r>
-            <a:endParaRPr lang="en-IE" dirty="0">
-              <a:solidFill>
-                <a:schemeClr val="tx2"/>
-              </a:solidFill>
-            </a:endParaRPr>
-          </a:p>
-          <a:p>
-            <a:r>
-              <a:rPr lang="en-IE" dirty="0" err="1">
-                <a:solidFill>
-                  <a:schemeClr val="tx2"/>
-                </a:solidFill>
-              </a:rPr>
-              <a:t>GitHub</a:t>
-            </a:r>
-            <a:r>
-              <a:rPr lang="en-IE" dirty="0">
-                <a:solidFill>
-                  <a:schemeClr val="tx2"/>
-                </a:solidFill>
-              </a:rPr>
-              <a:t> for Windows</a:t>
-            </a:r>
-          </a:p>
-          <a:p>
-            <a:r>
-              <a:rPr lang="en-IE" dirty="0">
-                <a:solidFill>
-                  <a:schemeClr val="tx2"/>
-                </a:solidFill>
-              </a:rPr>
-              <a:t>Branching and </a:t>
-            </a:r>
-            <a:r>
-              <a:rPr lang="en-IE" dirty="0" smtClean="0">
-                <a:solidFill>
-                  <a:schemeClr val="tx2"/>
-                </a:solidFill>
-              </a:rPr>
-              <a:t>Merging</a:t>
-            </a:r>
-          </a:p>
-          <a:p>
-            <a:r>
-              <a:rPr lang="en-IE" dirty="0" smtClean="0">
-                <a:solidFill>
-                  <a:schemeClr val="tx2"/>
-                </a:solidFill>
-              </a:rPr>
-              <a:t>Git internals</a:t>
-            </a:r>
-          </a:p>
-          <a:p>
-            <a:r>
-              <a:rPr lang="en-IE" dirty="0" smtClean="0">
-                <a:solidFill>
-                  <a:schemeClr val="tx2"/>
-                </a:solidFill>
-              </a:rPr>
-              <a:t>Resources</a:t>
-            </a:r>
-            <a:endParaRPr lang="en-IE" dirty="0" smtClean="0"/>
-          </a:p>
-          <a:p>
-            <a:endParaRPr lang="en-IE" dirty="0"/>
-          </a:p>
-        </p:txBody>
-      </p:sp>
-      <p:pic>
-        <p:nvPicPr>
-          <p:cNvPr id="7" name="Picture 6"/>
-          <p:cNvPicPr>
-            <a:picLocks noChangeAspect="1"/>
-          </p:cNvPicPr>
-          <p:nvPr/>
-        </p:nvPicPr>
-        <p:blipFill>
-          <a:blip r:embed="rId2">
-            <a:extLst>
-              <a:ext uri="{28A0092B-C50C-407E-A947-70E740481C1C}">
-                <a14:useLocalDpi xmlns:a14="http://schemas.microsoft.com/office/drawing/2010/main" val="0"/>
-              </a:ext>
-            </a:extLst>
-          </a:blip>
-          <a:stretch>
-            <a:fillRect/>
-          </a:stretch>
-        </p:blipFill>
-        <p:spPr>
-          <a:xfrm>
-            <a:off x="9433135" y="169334"/>
-            <a:ext cx="2519681" cy="1049867"/>
-          </a:xfrm>
-          <a:prstGeom prst="rect">
-            <a:avLst/>
-          </a:prstGeom>
-        </p:spPr>
-      </p:pic>
-    </p:spTree>
-    <p:extLst>
-      <p:ext uri="{BB962C8B-B14F-4D97-AF65-F5344CB8AC3E}">
-        <p14:creationId xmlns:p14="http://schemas.microsoft.com/office/powerpoint/2010/main" val="1737230421"/>
       </p:ext>
     </p:extLst>
   </p:cSld>
@@ -8375,7 +10179,7 @@
         <p:spPr>
           <a:xfrm>
             <a:off x="838200" y="1310747"/>
-            <a:ext cx="10515600" cy="4351338"/>
+            <a:ext cx="10515600" cy="5327120"/>
           </a:xfrm>
         </p:spPr>
         <p:txBody>
@@ -8451,23 +10255,7 @@
                   <a:schemeClr val="tx2"/>
                 </a:solidFill>
               </a:rPr>
-              <a:t>Handle small to </a:t>
-            </a:r>
-            <a:r>
-              <a:rPr lang="en-IE" dirty="0" smtClean="0">
-                <a:solidFill>
-                  <a:schemeClr val="tx2"/>
-                </a:solidFill>
-              </a:rPr>
-              <a:t>large </a:t>
-            </a:r>
-            <a:r>
-              <a:rPr lang="en-IE" dirty="0" smtClean="0">
-                <a:solidFill>
-                  <a:schemeClr val="tx2"/>
-                </a:solidFill>
-              </a:rPr>
-              <a:t>projects</a:t>
+              <a:t>Handle small to large projects</a:t>
             </a:r>
           </a:p>
           <a:p>
@@ -8500,7 +10288,50 @@
                   <a:schemeClr val="tx2"/>
                 </a:solidFill>
               </a:rPr>
-              <a:t>Simplicity	</a:t>
+              <a:t>Simplicity</a:t>
+            </a:r>
+          </a:p>
+          <a:p>
+            <a:r>
+              <a:rPr lang="en-IE" dirty="0" smtClean="0">
+                <a:solidFill>
+                  <a:schemeClr val="tx2"/>
+                </a:solidFill>
+              </a:rPr>
+              <a:t>No network required</a:t>
+            </a:r>
+          </a:p>
+          <a:p>
+            <a:r>
+              <a:rPr lang="en-IE" dirty="0" smtClean="0">
+                <a:solidFill>
+                  <a:schemeClr val="tx2"/>
+                </a:solidFill>
+              </a:rPr>
+              <a:t>Immutable</a:t>
+            </a:r>
+            <a:r>
+              <a:rPr lang="en-IE" dirty="0" smtClean="0">
+                <a:solidFill>
+                  <a:schemeClr val="tx2"/>
+                </a:solidFill>
+              </a:rPr>
+              <a:t>	</a:t>
+            </a:r>
+            <a:endParaRPr lang="en-IE" dirty="0" smtClean="0">
+              <a:solidFill>
+                <a:schemeClr val="tx2"/>
+              </a:solidFill>
+            </a:endParaRPr>
+          </a:p>
+          <a:p>
+            <a:r>
+              <a:rPr lang="en-IE" dirty="0" smtClean="0">
+                <a:solidFill>
+                  <a:schemeClr val="tx2"/>
+                </a:solidFill>
+              </a:rPr>
+              <a:t>Not like others</a:t>
             </a:r>
             <a:endParaRPr lang="en-IE" dirty="0"/>
           </a:p>
@@ -8591,6 +10422,133 @@
           <a:lstStyle/>
           <a:p>
             <a:r>
+              <a:rPr lang="en-IE" dirty="0" smtClean="0">
+                <a:solidFill>
+                  <a:schemeClr val="tx2"/>
+                </a:solidFill>
+              </a:rPr>
+              <a:t/>
+            </a:r>
+            <a:br>
+              <a:rPr lang="en-IE" dirty="0" smtClean="0">
+                <a:solidFill>
+                  <a:schemeClr val="tx2"/>
+                </a:solidFill>
+              </a:rPr>
+            </a:br>
+            <a:endParaRPr lang="en-IE" dirty="0"/>
+          </a:p>
+        </p:txBody>
+      </p:sp>
+      <p:pic>
+        <p:nvPicPr>
+          <p:cNvPr id="4" name="Picture 3"/>
+          <p:cNvPicPr>
+            <a:picLocks noChangeAspect="1"/>
+          </p:cNvPicPr>
+          <p:nvPr/>
+        </p:nvPicPr>
+        <p:blipFill>
+          <a:blip r:embed="rId2">
+            <a:extLst>
+              <a:ext uri="{28A0092B-C50C-407E-A947-70E740481C1C}">
+                <a14:useLocalDpi xmlns:a14="http://schemas.microsoft.com/office/drawing/2010/main" val="0"/>
+              </a:ext>
+            </a:extLst>
+          </a:blip>
+          <a:stretch>
+            <a:fillRect/>
+          </a:stretch>
+        </p:blipFill>
+        <p:spPr>
+          <a:xfrm>
+            <a:off x="9433135" y="169334"/>
+            <a:ext cx="2519681" cy="1049867"/>
+          </a:xfrm>
+          <a:prstGeom prst="rect">
+            <a:avLst/>
+          </a:prstGeom>
+        </p:spPr>
+      </p:pic>
+      <p:pic>
+        <p:nvPicPr>
+          <p:cNvPr id="5" name="Picture 4"/>
+          <p:cNvPicPr>
+            <a:picLocks noChangeAspect="1"/>
+          </p:cNvPicPr>
+          <p:nvPr/>
+        </p:nvPicPr>
+        <p:blipFill>
+          <a:blip r:embed="rId3"/>
+          <a:stretch>
+            <a:fillRect/>
+          </a:stretch>
+        </p:blipFill>
+        <p:spPr>
+          <a:xfrm>
+            <a:off x="2370667" y="365125"/>
+            <a:ext cx="6671204" cy="5952905"/>
+          </a:xfrm>
+          <a:prstGeom prst="rect">
+            <a:avLst/>
+          </a:prstGeom>
+        </p:spPr>
+      </p:pic>
+    </p:spTree>
+    <p:extLst>
+      <p:ext uri="{BB962C8B-B14F-4D97-AF65-F5344CB8AC3E}">
+        <p14:creationId xmlns:p14="http://schemas.microsoft.com/office/powerpoint/2010/main" val="4283874186"/>
+      </p:ext>
+    </p:extLst>
+  </p:cSld>
+  <p:clrMapOvr>
+    <a:masterClrMapping/>
+  </p:clrMapOvr>
+  <p:timing>
+    <p:tnLst>
+      <p:par>
+        <p:cTn id="1" dur="indefinite" restart="never" nodeType="tmRoot"/>
+      </p:par>
+    </p:tnLst>
+  </p:timing>
+</p:sld>
+</file>
+
+<file path=ppt/slides/slide9.xml><?xml version="1.0" encoding="utf-8"?>
+<p:sld xmlns:a="http://schemas.openxmlformats.org/drawingml/2006/main" xmlns:r="http://schemas.openxmlformats.org/officeDocument/2006/relationships" xmlns:p="http://schemas.openxmlformats.org/presentationml/2006/main">
+  <p:cSld>
+    <p:spTree>
+      <p:nvGrpSpPr>
+        <p:cNvPr id="1" name=""/>
+        <p:cNvGrpSpPr/>
+        <p:nvPr/>
+      </p:nvGrpSpPr>
+      <p:grpSpPr>
+        <a:xfrm>
+          <a:off x="0" y="0"/>
+          <a:ext cx="0" cy="0"/>
+          <a:chOff x="0" y="0"/>
+          <a:chExt cx="0" cy="0"/>
+        </a:xfrm>
+      </p:grpSpPr>
+      <p:sp>
+        <p:nvSpPr>
+          <p:cNvPr id="2" name="Title 1"/>
+          <p:cNvSpPr>
+            <a:spLocks noGrp="1"/>
+          </p:cNvSpPr>
+          <p:nvPr>
+            <p:ph type="title"/>
+          </p:nvPr>
+        </p:nvSpPr>
+        <p:spPr/>
+        <p:txBody>
+          <a:bodyPr>
+            <a:normAutofit/>
+          </a:bodyPr>
+          <a:lstStyle/>
+          <a:p>
+            <a:r>
               <a:rPr lang="en-IE" b="1" dirty="0" smtClean="0">
                 <a:solidFill>
                   <a:schemeClr val="tx2"/>
@@ -8867,488 +10825,6 @@
     <p:extLst>
       <p:ext uri="{BB962C8B-B14F-4D97-AF65-F5344CB8AC3E}">
         <p14:creationId xmlns:p14="http://schemas.microsoft.com/office/powerpoint/2010/main" val="2061960704"/>
-      </p:ext>
-    </p:extLst>
-  </p:cSld>
-  <p:clrMapOvr>
-    <a:masterClrMapping/>
-  </p:clrMapOvr>
-  <p:timing>
-    <p:tnLst>
-      <p:par>
-        <p:cTn id="1" dur="indefinite" restart="never" nodeType="tmRoot"/>
-      </p:par>
-    </p:tnLst>
-  </p:timing>
-</p:sld>
-</file>
-
-<file path=ppt/slides/slide9.xml><?xml version="1.0" encoding="utf-8"?>
-<p:sld xmlns:a="http://schemas.openxmlformats.org/drawingml/2006/main" xmlns:r="http://schemas.openxmlformats.org/officeDocument/2006/relationships" xmlns:p="http://schemas.openxmlformats.org/presentationml/2006/main">
-  <p:cSld>
-    <p:spTree>
-      <p:nvGrpSpPr>
-        <p:cNvPr id="1" name=""/>
-        <p:cNvGrpSpPr/>
-        <p:nvPr/>
-      </p:nvGrpSpPr>
-      <p:grpSpPr>
-        <a:xfrm>
-          <a:off x="0" y="0"/>
-          <a:ext cx="0" cy="0"/>
-          <a:chOff x="0" y="0"/>
-          <a:chExt cx="0" cy="0"/>
-        </a:xfrm>
-      </p:grpSpPr>
-      <p:sp>
-        <p:nvSpPr>
-          <p:cNvPr id="2" name="Title 1"/>
-          <p:cNvSpPr>
-            <a:spLocks noGrp="1"/>
-          </p:cNvSpPr>
-          <p:nvPr>
-            <p:ph type="title"/>
-          </p:nvPr>
-        </p:nvSpPr>
-        <p:spPr>
-          <a:xfrm>
-            <a:off x="838200" y="402035"/>
-            <a:ext cx="10515600" cy="1325563"/>
-          </a:xfrm>
-        </p:spPr>
-        <p:txBody>
-          <a:bodyPr>
-            <a:normAutofit/>
-          </a:bodyPr>
-          <a:lstStyle/>
-          <a:p>
-            <a:r>
-              <a:rPr lang="en-IE" b="1" dirty="0" smtClean="0">
-                <a:solidFill>
-                  <a:schemeClr val="tx2"/>
-                </a:solidFill>
-              </a:rPr>
-              <a:t>Installation </a:t>
-            </a:r>
-            <a:r>
-              <a:rPr lang="en-IE" b="1" dirty="0">
-                <a:solidFill>
-                  <a:schemeClr val="tx2"/>
-                </a:solidFill>
-              </a:rPr>
-              <a:t>O</a:t>
-            </a:r>
-            <a:r>
-              <a:rPr lang="en-IE" b="1" dirty="0" smtClean="0">
-                <a:solidFill>
-                  <a:schemeClr val="tx2"/>
-                </a:solidFill>
-              </a:rPr>
-              <a:t>n Windows</a:t>
-            </a:r>
-            <a:endParaRPr lang="en-IE" b="1" dirty="0">
-              <a:solidFill>
-                <a:schemeClr val="tx2"/>
-              </a:solidFill>
-            </a:endParaRPr>
-          </a:p>
-        </p:txBody>
-      </p:sp>
-      <p:sp>
-        <p:nvSpPr>
-          <p:cNvPr id="3" name="Content Placeholder 2"/>
-          <p:cNvSpPr>
-            <a:spLocks noGrp="1"/>
-          </p:cNvSpPr>
-          <p:nvPr>
-            <p:ph idx="1"/>
-          </p:nvPr>
-        </p:nvSpPr>
-        <p:spPr>
-          <a:xfrm>
-            <a:off x="838200" y="1581546"/>
-            <a:ext cx="10515600" cy="1171575"/>
-          </a:xfrm>
-        </p:spPr>
-        <p:txBody>
-          <a:bodyPr>
-            <a:normAutofit/>
-          </a:bodyPr>
-          <a:lstStyle/>
-          <a:p>
-            <a:pPr marL="0" indent="0">
-              <a:buNone/>
-            </a:pPr>
-            <a:r>
-              <a:rPr lang="en-IE" dirty="0" smtClean="0">
-                <a:solidFill>
-                  <a:schemeClr val="tx2"/>
-                </a:solidFill>
-              </a:rPr>
-              <a:t/>
-            </a:r>
-            <a:br>
-              <a:rPr lang="en-IE" dirty="0" smtClean="0">
-                <a:solidFill>
-                  <a:schemeClr val="tx2"/>
-                </a:solidFill>
-              </a:rPr>
-            </a:br>
-            <a:r>
-              <a:rPr lang="en-IE" dirty="0" smtClean="0">
-                <a:solidFill>
-                  <a:schemeClr val="tx2"/>
-                </a:solidFill>
-              </a:rPr>
-              <a:t>http://msysgit.github.io/</a:t>
-            </a:r>
-            <a:endParaRPr lang="en-IE" dirty="0">
-              <a:solidFill>
-                <a:schemeClr val="tx2"/>
-              </a:solidFill>
-            </a:endParaRPr>
-          </a:p>
-        </p:txBody>
-      </p:sp>
-      <p:pic>
-        <p:nvPicPr>
-          <p:cNvPr id="4" name="Picture 3"/>
-          <p:cNvPicPr>
-            <a:picLocks noChangeAspect="1"/>
-          </p:cNvPicPr>
-          <p:nvPr/>
-        </p:nvPicPr>
-        <p:blipFill>
-          <a:blip r:embed="rId2">
-            <a:extLst>
-              <a:ext uri="{28A0092B-C50C-407E-A947-70E740481C1C}">
-                <a14:useLocalDpi xmlns:a14="http://schemas.microsoft.com/office/drawing/2010/main" val="0"/>
-              </a:ext>
-            </a:extLst>
-          </a:blip>
-          <a:stretch>
-            <a:fillRect/>
-          </a:stretch>
-        </p:blipFill>
-        <p:spPr>
-          <a:xfrm>
-            <a:off x="9433135" y="169334"/>
-            <a:ext cx="2519681" cy="1049867"/>
-          </a:xfrm>
-          <a:prstGeom prst="rect">
-            <a:avLst/>
-          </a:prstGeom>
-        </p:spPr>
-      </p:pic>
-      <p:sp>
-        <p:nvSpPr>
-          <p:cNvPr id="5" name="Title 1"/>
-          <p:cNvSpPr txBox="1">
-            <a:spLocks/>
-          </p:cNvSpPr>
-          <p:nvPr/>
-        </p:nvSpPr>
-        <p:spPr>
-          <a:xfrm>
-            <a:off x="838200" y="2675731"/>
-            <a:ext cx="10515600" cy="1325563"/>
-          </a:xfrm>
-          <a:prstGeom prst="rect">
-            <a:avLst/>
-          </a:prstGeom>
-        </p:spPr>
-        <p:txBody>
-          <a:bodyPr vert="horz" lIns="91440" tIns="45720" rIns="91440" bIns="45720" rtlCol="0" anchor="ctr">
-            <a:normAutofit/>
-          </a:bodyPr>
-          <a:lstStyle>
-            <a:lvl1pPr algn="l" defTabSz="914400" rtl="0" eaLnBrk="1" latinLnBrk="0" hangingPunct="1">
-              <a:lnSpc>
-                <a:spcPct val="90000"/>
-              </a:lnSpc>
-              <a:spcBef>
-                <a:spcPct val="0"/>
-              </a:spcBef>
-              <a:buNone/>
-              <a:defRPr sz="4400" kern="1200">
-                <a:solidFill>
-                  <a:schemeClr val="tx1"/>
-                </a:solidFill>
-                <a:latin typeface="+mj-lt"/>
-                <a:ea typeface="+mj-ea"/>
-                <a:cs typeface="+mj-cs"/>
-              </a:defRPr>
-            </a:lvl1pPr>
-          </a:lstStyle>
-          <a:p>
-            <a:r>
-              <a:rPr lang="en-IE" b="1" dirty="0" smtClean="0">
-                <a:solidFill>
-                  <a:schemeClr val="tx2"/>
-                </a:solidFill>
-              </a:rPr>
-              <a:t>Configure Git</a:t>
-            </a:r>
-            <a:endParaRPr lang="en-IE" b="1" dirty="0">
-              <a:solidFill>
-                <a:schemeClr val="tx2"/>
-              </a:solidFill>
-            </a:endParaRPr>
-          </a:p>
-        </p:txBody>
-      </p:sp>
-      <p:sp>
-        <p:nvSpPr>
-          <p:cNvPr id="6" name="Content Placeholder 2"/>
-          <p:cNvSpPr txBox="1">
-            <a:spLocks/>
-          </p:cNvSpPr>
-          <p:nvPr/>
-        </p:nvSpPr>
-        <p:spPr>
-          <a:xfrm>
-            <a:off x="838200" y="4061487"/>
-            <a:ext cx="10515600" cy="2023269"/>
-          </a:xfrm>
-          <a:prstGeom prst="rect">
-            <a:avLst/>
-          </a:prstGeom>
-        </p:spPr>
-        <p:txBody>
-          <a:bodyPr vert="horz" lIns="91440" tIns="45720" rIns="91440" bIns="45720" rtlCol="0">
-            <a:normAutofit/>
-          </a:bodyPr>
-          <a:lstStyle>
-            <a:lvl1pPr marL="228600" indent="-228600" algn="l" defTabSz="914400" rtl="0" eaLnBrk="1" latinLnBrk="0" hangingPunct="1">
-              <a:lnSpc>
-                <a:spcPct val="90000"/>
-              </a:lnSpc>
-              <a:spcBef>
-                <a:spcPts val="1000"/>
-              </a:spcBef>
-              <a:buFont typeface="Arial" panose="020B0604020202020204" pitchFamily="34" charset="0"/>
-              <a:buChar char="•"/>
-              <a:defRPr sz="2800" kern="1200">
-                <a:solidFill>
-                  <a:schemeClr val="tx1"/>
-                </a:solidFill>
-                <a:latin typeface="+mn-lt"/>
-                <a:ea typeface="+mn-ea"/>
-                <a:cs typeface="+mn-cs"/>
-              </a:defRPr>
-            </a:lvl1pPr>
-            <a:lvl2pPr marL="685800" indent="-228600" algn="l" defTabSz="914400" rtl="0" eaLnBrk="1" latinLnBrk="0" hangingPunct="1">
-              <a:lnSpc>
-                <a:spcPct val="90000"/>
-              </a:lnSpc>
-              <a:spcBef>
-                <a:spcPts val="500"/>
-              </a:spcBef>
-              <a:buFont typeface="Arial" panose="020B0604020202020204" pitchFamily="34" charset="0"/>
-              <a:buChar char="•"/>
-              <a:defRPr sz="2400" kern="1200">
-                <a:solidFill>
-                  <a:schemeClr val="tx1"/>
-                </a:solidFill>
-                <a:latin typeface="+mn-lt"/>
-                <a:ea typeface="+mn-ea"/>
-                <a:cs typeface="+mn-cs"/>
-              </a:defRPr>
-            </a:lvl2pPr>
-            <a:lvl3pPr marL="1143000" indent="-228600" algn="l" defTabSz="914400" rtl="0" eaLnBrk="1" latinLnBrk="0" hangingPunct="1">
-              <a:lnSpc>
-                <a:spcPct val="90000"/>
-              </a:lnSpc>
-              <a:spcBef>
-                <a:spcPts val="500"/>
-              </a:spcBef>
-              <a:buFont typeface="Arial" panose="020B0604020202020204" pitchFamily="34" charset="0"/>
-              <a:buChar char="•"/>
-              <a:defRPr sz="2000" kern="1200">
-                <a:solidFill>
-                  <a:schemeClr val="tx1"/>
-                </a:solidFill>
-                <a:latin typeface="+mn-lt"/>
-                <a:ea typeface="+mn-ea"/>
-                <a:cs typeface="+mn-cs"/>
-              </a:defRPr>
-            </a:lvl3pPr>
-            <a:lvl4pPr marL="1600200" indent="-228600" algn="l" defTabSz="914400" rtl="0" eaLnBrk="1" latinLnBrk="0" hangingPunct="1">
-              <a:lnSpc>
-                <a:spcPct val="90000"/>
-              </a:lnSpc>
-              <a:spcBef>
-                <a:spcPts val="500"/>
-              </a:spcBef>
-              <a:buFont typeface="Arial" panose="020B0604020202020204" pitchFamily="34" charset="0"/>
-              <a:buChar char="•"/>
-              <a:defRPr sz="1800" kern="1200">
-                <a:solidFill>
-                  <a:schemeClr val="tx1"/>
-                </a:solidFill>
-                <a:latin typeface="+mn-lt"/>
-                <a:ea typeface="+mn-ea"/>
-                <a:cs typeface="+mn-cs"/>
-              </a:defRPr>
-            </a:lvl4pPr>
-            <a:lvl5pPr marL="2057400" indent="-228600" algn="l" defTabSz="914400" rtl="0" eaLnBrk="1" latinLnBrk="0" hangingPunct="1">
-              <a:lnSpc>
-                <a:spcPct val="90000"/>
-              </a:lnSpc>
-              <a:spcBef>
-                <a:spcPts val="500"/>
-              </a:spcBef>
-              <a:buFont typeface="Arial" panose="020B0604020202020204" pitchFamily="34" charset="0"/>
-              <a:buChar char="•"/>
-              <a:defRPr sz="1800" kern="1200">
-                <a:solidFill>
-                  <a:schemeClr val="tx1"/>
-                </a:solidFill>
-                <a:latin typeface="+mn-lt"/>
-                <a:ea typeface="+mn-ea"/>
-                <a:cs typeface="+mn-cs"/>
-              </a:defRPr>
-            </a:lvl5pPr>
-            <a:lvl6pPr marL="2514600" indent="-228600" algn="l" defTabSz="914400" rtl="0" eaLnBrk="1" latinLnBrk="0" hangingPunct="1">
-              <a:lnSpc>
-                <a:spcPct val="90000"/>
-              </a:lnSpc>
-              <a:spcBef>
-                <a:spcPts val="500"/>
-              </a:spcBef>
-              <a:buFont typeface="Arial" panose="020B0604020202020204" pitchFamily="34" charset="0"/>
-              <a:buChar char="•"/>
-              <a:defRPr sz="1800" kern="1200">
-                <a:solidFill>
-                  <a:schemeClr val="tx1"/>
-                </a:solidFill>
-                <a:latin typeface="+mn-lt"/>
-                <a:ea typeface="+mn-ea"/>
-                <a:cs typeface="+mn-cs"/>
-              </a:defRPr>
-            </a:lvl6pPr>
-            <a:lvl7pPr marL="2971800" indent="-228600" algn="l" defTabSz="914400" rtl="0" eaLnBrk="1" latinLnBrk="0" hangingPunct="1">
-              <a:lnSpc>
-                <a:spcPct val="90000"/>
-              </a:lnSpc>
-              <a:spcBef>
-                <a:spcPts val="500"/>
-              </a:spcBef>
-              <a:buFont typeface="Arial" panose="020B0604020202020204" pitchFamily="34" charset="0"/>
-              <a:buChar char="•"/>
-              <a:defRPr sz="1800" kern="1200">
-                <a:solidFill>
-                  <a:schemeClr val="tx1"/>
-                </a:solidFill>
-                <a:latin typeface="+mn-lt"/>
-                <a:ea typeface="+mn-ea"/>
-                <a:cs typeface="+mn-cs"/>
-              </a:defRPr>
-            </a:lvl7pPr>
-            <a:lvl8pPr marL="3429000" indent="-228600" algn="l" defTabSz="914400" rtl="0" eaLnBrk="1" latinLnBrk="0" hangingPunct="1">
-              <a:lnSpc>
-                <a:spcPct val="90000"/>
-              </a:lnSpc>
-              <a:spcBef>
-                <a:spcPts val="500"/>
-              </a:spcBef>
-              <a:buFont typeface="Arial" panose="020B0604020202020204" pitchFamily="34" charset="0"/>
-              <a:buChar char="•"/>
-              <a:defRPr sz="1800" kern="1200">
-                <a:solidFill>
-                  <a:schemeClr val="tx1"/>
-                </a:solidFill>
-                <a:latin typeface="+mn-lt"/>
-                <a:ea typeface="+mn-ea"/>
-                <a:cs typeface="+mn-cs"/>
-              </a:defRPr>
-            </a:lvl8pPr>
-            <a:lvl9pPr marL="3886200" indent="-228600" algn="l" defTabSz="914400" rtl="0" eaLnBrk="1" latinLnBrk="0" hangingPunct="1">
-              <a:lnSpc>
-                <a:spcPct val="90000"/>
-              </a:lnSpc>
-              <a:spcBef>
-                <a:spcPts val="500"/>
-              </a:spcBef>
-              <a:buFont typeface="Arial" panose="020B0604020202020204" pitchFamily="34" charset="0"/>
-              <a:buChar char="•"/>
-              <a:defRPr sz="1800" kern="1200">
-                <a:solidFill>
-                  <a:schemeClr val="tx1"/>
-                </a:solidFill>
-                <a:latin typeface="+mn-lt"/>
-                <a:ea typeface="+mn-ea"/>
-                <a:cs typeface="+mn-cs"/>
-              </a:defRPr>
-            </a:lvl9pPr>
-          </a:lstStyle>
-          <a:p>
-            <a:r>
-              <a:rPr lang="en-IE" smtClean="0">
-                <a:solidFill>
-                  <a:schemeClr val="tx2"/>
-                </a:solidFill>
-              </a:rPr>
-              <a:t>Levels</a:t>
-            </a:r>
-          </a:p>
-          <a:p>
-            <a:pPr lvl="1"/>
-            <a:r>
-              <a:rPr lang="en-IE" smtClean="0">
-                <a:solidFill>
-                  <a:schemeClr val="tx2"/>
-                </a:solidFill>
-              </a:rPr>
-              <a:t>System</a:t>
-            </a:r>
-          </a:p>
-          <a:p>
-            <a:pPr lvl="1"/>
-            <a:r>
-              <a:rPr lang="en-IE" smtClean="0">
-                <a:solidFill>
-                  <a:schemeClr val="tx2"/>
-                </a:solidFill>
-              </a:rPr>
-              <a:t>User</a:t>
-            </a:r>
-          </a:p>
-          <a:p>
-            <a:pPr lvl="1"/>
-            <a:r>
-              <a:rPr lang="en-IE" smtClean="0">
-                <a:solidFill>
-                  <a:schemeClr val="tx2"/>
-                </a:solidFill>
-              </a:rPr>
-              <a:t>Repository</a:t>
-            </a:r>
-          </a:p>
-          <a:p>
-            <a:pPr marL="457200" lvl="1" indent="0">
-              <a:buFont typeface="Arial" panose="020B0604020202020204" pitchFamily="34" charset="0"/>
-              <a:buNone/>
-            </a:pPr>
-            <a:endParaRPr lang="en-IE" smtClean="0">
-              <a:solidFill>
-                <a:schemeClr val="tx2"/>
-              </a:solidFill>
-            </a:endParaRPr>
-          </a:p>
-          <a:p>
-            <a:pPr marL="0" indent="0">
-              <a:buFont typeface="Arial" panose="020B0604020202020204" pitchFamily="34" charset="0"/>
-              <a:buNone/>
-            </a:pPr>
-            <a:endParaRPr lang="en-IE" dirty="0"/>
-          </a:p>
-        </p:txBody>
-      </p:sp>
-    </p:spTree>
-    <p:extLst>
-      <p:ext uri="{BB962C8B-B14F-4D97-AF65-F5344CB8AC3E}">
-        <p14:creationId xmlns:p14="http://schemas.microsoft.com/office/powerpoint/2010/main" val="616174293"/>
       </p:ext>
     </p:extLst>
   </p:cSld>

</xml_diff>